<commit_message>
peanut butter jelly time!
</commit_message>
<xml_diff>
--- a/documents/presentation1/Presentation1.pptx
+++ b/documents/presentation1/Presentation1.pptx
@@ -5,10 +5,10 @@
     <p:sldMasterId id="2147484579" r:id="rId1"/>
   </p:sldMasterIdLst>
   <p:notesMasterIdLst>
-    <p:notesMasterId r:id="rId15"/>
+    <p:notesMasterId r:id="rId18"/>
   </p:notesMasterIdLst>
   <p:handoutMasterIdLst>
-    <p:handoutMasterId r:id="rId16"/>
+    <p:handoutMasterId r:id="rId19"/>
   </p:handoutMasterIdLst>
   <p:sldIdLst>
     <p:sldId id="256" r:id="rId2"/>
@@ -22,8 +22,11 @@
     <p:sldId id="267" r:id="rId10"/>
     <p:sldId id="268" r:id="rId11"/>
     <p:sldId id="269" r:id="rId12"/>
-    <p:sldId id="260" r:id="rId13"/>
-    <p:sldId id="261" r:id="rId14"/>
+    <p:sldId id="270" r:id="rId13"/>
+    <p:sldId id="271" r:id="rId14"/>
+    <p:sldId id="272" r:id="rId15"/>
+    <p:sldId id="273" r:id="rId16"/>
+    <p:sldId id="274" r:id="rId17"/>
   </p:sldIdLst>
   <p:sldSz cx="9144000" cy="6858000" type="screen4x3"/>
   <p:notesSz cx="6858000" cy="9144000"/>
@@ -815,9 +818,8 @@
           <a:bodyPr/>
           <a:lstStyle/>
           <a:p>
-            <a:fld id="{54AB02A5-4FE5-49D9-9E24-09F23B90C450}" type="datetimeFigureOut">
+            <a:fld id="{8DC6FEE2-530A-4B4C-961B-CC7CECCA7127}" type="datetime1">
               <a:rPr lang="en-US" smtClean="0"/>
-              <a:pPr/>
               <a:t>3/14/2010</a:t>
             </a:fld>
             <a:endParaRPr lang="en-US"/>
@@ -982,9 +984,8 @@
           <a:bodyPr/>
           <a:lstStyle/>
           <a:p>
-            <a:fld id="{56E4B7E3-93E9-2A43-A81C-4D1D75D04FF6}" type="datetimeFigureOut">
+            <a:fld id="{8EAEC9DA-5CE0-4C6B-ABA7-501EEB3F088D}" type="datetime1">
               <a:rPr lang="en-US" smtClean="0"/>
-              <a:pPr/>
               <a:t>3/14/2010</a:t>
             </a:fld>
             <a:endParaRPr lang="en-US"/>
@@ -1159,9 +1160,8 @@
           <a:bodyPr/>
           <a:lstStyle/>
           <a:p>
-            <a:fld id="{56E4B7E3-93E9-2A43-A81C-4D1D75D04FF6}" type="datetimeFigureOut">
+            <a:fld id="{A812D705-CA8C-4FD9-BD64-3162E88759DB}" type="datetime1">
               <a:rPr lang="en-US" smtClean="0"/>
-              <a:pPr/>
               <a:t>3/14/2010</a:t>
             </a:fld>
             <a:endParaRPr lang="en-US"/>
@@ -1326,9 +1326,8 @@
           <a:bodyPr/>
           <a:lstStyle/>
           <a:p>
-            <a:fld id="{56E4B7E3-93E9-2A43-A81C-4D1D75D04FF6}" type="datetimeFigureOut">
+            <a:fld id="{E49A3D7D-BF81-43F8-B74D-70CBF29EAD1B}" type="datetime1">
               <a:rPr lang="en-US" smtClean="0"/>
-              <a:pPr/>
               <a:t>3/14/2010</a:t>
             </a:fld>
             <a:endParaRPr lang="en-US"/>
@@ -1569,9 +1568,8 @@
           <a:bodyPr/>
           <a:lstStyle/>
           <a:p>
-            <a:fld id="{74CBEAF9-9E58-4CC8-A6FF-6DD8A58DEEA4}" type="datetimeFigureOut">
+            <a:fld id="{E800B5AA-ADB8-4951-8EDB-F43FC54D2DB6}" type="datetime1">
               <a:rPr lang="en-US" smtClean="0"/>
-              <a:pPr/>
               <a:t>3/14/2010</a:t>
             </a:fld>
             <a:endParaRPr lang="en-US"/>
@@ -1854,9 +1852,8 @@
           <a:bodyPr/>
           <a:lstStyle/>
           <a:p>
-            <a:fld id="{56E4B7E3-93E9-2A43-A81C-4D1D75D04FF6}" type="datetimeFigureOut">
+            <a:fld id="{0F2DCC71-F033-47A3-8AB4-C05FC603AEFA}" type="datetime1">
               <a:rPr lang="en-US" smtClean="0"/>
-              <a:pPr/>
               <a:t>3/14/2010</a:t>
             </a:fld>
             <a:endParaRPr lang="en-US"/>
@@ -2273,9 +2270,8 @@
           <a:bodyPr/>
           <a:lstStyle/>
           <a:p>
-            <a:fld id="{56E4B7E3-93E9-2A43-A81C-4D1D75D04FF6}" type="datetimeFigureOut">
+            <a:fld id="{256AE2A7-37A0-47E5-BBB8-D250445BA08E}" type="datetime1">
               <a:rPr lang="en-US" smtClean="0"/>
-              <a:pPr/>
               <a:t>3/14/2010</a:t>
             </a:fld>
             <a:endParaRPr lang="en-US"/>
@@ -2388,9 +2384,8 @@
           <a:bodyPr/>
           <a:lstStyle/>
           <a:p>
-            <a:fld id="{56E4B7E3-93E9-2A43-A81C-4D1D75D04FF6}" type="datetimeFigureOut">
+            <a:fld id="{97DB75A9-5E7C-4276-961C-5A8DB364CCD2}" type="datetime1">
               <a:rPr lang="en-US" smtClean="0"/>
-              <a:pPr/>
               <a:t>3/14/2010</a:t>
             </a:fld>
             <a:endParaRPr lang="en-US"/>
@@ -2480,9 +2475,8 @@
           <a:bodyPr/>
           <a:lstStyle/>
           <a:p>
-            <a:fld id="{56E4B7E3-93E9-2A43-A81C-4D1D75D04FF6}" type="datetimeFigureOut">
+            <a:fld id="{D7B4DFF3-C61A-43C7-A94A-DE570A03CE34}" type="datetime1">
               <a:rPr lang="en-US" smtClean="0"/>
-              <a:pPr/>
               <a:t>3/14/2010</a:t>
             </a:fld>
             <a:endParaRPr lang="en-US"/>
@@ -2754,9 +2748,8 @@
           <a:bodyPr/>
           <a:lstStyle/>
           <a:p>
-            <a:fld id="{56E4B7E3-93E9-2A43-A81C-4D1D75D04FF6}" type="datetimeFigureOut">
+            <a:fld id="{4F253FC1-A070-434F-B8AF-0344ED2C1D6C}" type="datetime1">
               <a:rPr lang="en-US" smtClean="0"/>
-              <a:pPr/>
               <a:t>3/14/2010</a:t>
             </a:fld>
             <a:endParaRPr lang="en-US"/>
@@ -3004,9 +2997,8 @@
           <a:bodyPr/>
           <a:lstStyle/>
           <a:p>
-            <a:fld id="{56E4B7E3-93E9-2A43-A81C-4D1D75D04FF6}" type="datetimeFigureOut">
+            <a:fld id="{E902211C-FCD0-4E53-B851-A64598532618}" type="datetime1">
               <a:rPr lang="en-US" smtClean="0"/>
-              <a:pPr/>
               <a:t>3/14/2010</a:t>
             </a:fld>
             <a:endParaRPr lang="en-US"/>
@@ -3223,9 +3215,8 @@
             </a:lvl1pPr>
           </a:lstStyle>
           <a:p>
-            <a:fld id="{56E4B7E3-93E9-2A43-A81C-4D1D75D04FF6}" type="datetimeFigureOut">
+            <a:fld id="{BCA6E734-F080-408B-8DE3-8924DE8A3AB2}" type="datetime1">
               <a:rPr lang="en-US" smtClean="0"/>
-              <a:pPr/>
               <a:t>3/14/2010</a:t>
             </a:fld>
             <a:endParaRPr lang="en-US"/>
@@ -3327,6 +3318,7 @@
     <p:sldLayoutId id="2147484589" r:id="rId10"/>
     <p:sldLayoutId id="2147484590" r:id="rId11"/>
   </p:sldLayoutIdLst>
+  <p:hf hdr="0" ftr="0" dt="0"/>
   <p:txStyles>
     <p:titleStyle>
       <a:lvl1pPr algn="ctr" defTabSz="457200" rtl="0" eaLnBrk="1" latinLnBrk="0" hangingPunct="1">
@@ -3691,6 +3683,30 @@
           </a:p>
         </p:txBody>
       </p:sp>
+      <p:sp>
+        <p:nvSpPr>
+          <p:cNvPr id="10" name="Slide Number Placeholder 9"/>
+          <p:cNvSpPr>
+            <a:spLocks noGrp="1"/>
+          </p:cNvSpPr>
+          <p:nvPr>
+            <p:ph type="sldNum" sz="quarter" idx="12"/>
+          </p:nvPr>
+        </p:nvSpPr>
+        <p:spPr/>
+        <p:txBody>
+          <a:bodyPr/>
+          <a:lstStyle/>
+          <a:p>
+            <a:fld id="{69E29E33-B620-47F9-BB04-8846C2A5AFCC}" type="slidenum">
+              <a:rPr kumimoji="0" lang="en-US" smtClean="0"/>
+              <a:pPr/>
+              <a:t>1</a:t>
+            </a:fld>
+            <a:endParaRPr kumimoji="0" lang="en-US"/>
+          </a:p>
+        </p:txBody>
+      </p:sp>
     </p:spTree>
   </p:cSld>
   <p:clrMapOvr>
@@ -3755,7 +3771,7 @@
                 <a:latin typeface="Arial" pitchFamily="34" charset="0"/>
                 <a:cs typeface="Arial" pitchFamily="34" charset="0"/>
               </a:rPr>
-              <a:t>Demonstration</a:t>
+              <a:t>Game Play</a:t>
             </a:r>
             <a:endParaRPr lang="en-US" dirty="0">
               <a:effectLst>
@@ -3771,6 +3787,56 @@
           </a:p>
         </p:txBody>
       </p:sp>
+      <p:sp>
+        <p:nvSpPr>
+          <p:cNvPr id="3" name="Slide Number Placeholder 2"/>
+          <p:cNvSpPr>
+            <a:spLocks noGrp="1"/>
+          </p:cNvSpPr>
+          <p:nvPr>
+            <p:ph type="sldNum" sz="quarter" idx="12"/>
+          </p:nvPr>
+        </p:nvSpPr>
+        <p:spPr/>
+        <p:txBody>
+          <a:bodyPr/>
+          <a:lstStyle/>
+          <a:p>
+            <a:fld id="{4A5A7388-53DE-DF4C-B882-890D8596A7FC}" type="slidenum">
+              <a:rPr lang="en-US" smtClean="0"/>
+              <a:pPr/>
+              <a:t>10</a:t>
+            </a:fld>
+            <a:endParaRPr lang="en-US"/>
+          </a:p>
+        </p:txBody>
+      </p:sp>
+      <p:pic>
+        <p:nvPicPr>
+          <p:cNvPr id="5" name="Picture 2" descr="C:\Users\Owner\Desktop\quiz monkey screenshots\Picture 3.png"/>
+          <p:cNvPicPr>
+            <a:picLocks noChangeAspect="1" noChangeArrowheads="1"/>
+          </p:cNvPicPr>
+          <p:nvPr/>
+        </p:nvPicPr>
+        <p:blipFill>
+          <a:blip r:embed="rId2"/>
+          <a:srcRect/>
+          <a:stretch>
+            <a:fillRect/>
+          </a:stretch>
+        </p:blipFill>
+        <p:spPr bwMode="auto">
+          <a:xfrm>
+            <a:off x="743870" y="1718331"/>
+            <a:ext cx="7738210" cy="4095611"/>
+          </a:xfrm>
+          <a:prstGeom prst="rect">
+            <a:avLst/>
+          </a:prstGeom>
+          <a:noFill/>
+        </p:spPr>
+      </p:pic>
     </p:spTree>
   </p:cSld>
   <p:clrMapOvr>
@@ -3835,7 +3901,7 @@
                 <a:latin typeface="Arial" pitchFamily="34" charset="0"/>
                 <a:cs typeface="Arial" pitchFamily="34" charset="0"/>
               </a:rPr>
-              <a:t>Demonstration</a:t>
+              <a:t>Answer correctly…</a:t>
             </a:r>
             <a:endParaRPr lang="en-US" dirty="0">
               <a:effectLst>
@@ -3851,6 +3917,56 @@
           </a:p>
         </p:txBody>
       </p:sp>
+      <p:sp>
+        <p:nvSpPr>
+          <p:cNvPr id="3" name="Slide Number Placeholder 2"/>
+          <p:cNvSpPr>
+            <a:spLocks noGrp="1"/>
+          </p:cNvSpPr>
+          <p:nvPr>
+            <p:ph type="sldNum" sz="quarter" idx="12"/>
+          </p:nvPr>
+        </p:nvSpPr>
+        <p:spPr/>
+        <p:txBody>
+          <a:bodyPr/>
+          <a:lstStyle/>
+          <a:p>
+            <a:fld id="{4A5A7388-53DE-DF4C-B882-890D8596A7FC}" type="slidenum">
+              <a:rPr lang="en-US" smtClean="0"/>
+              <a:pPr/>
+              <a:t>11</a:t>
+            </a:fld>
+            <a:endParaRPr lang="en-US"/>
+          </a:p>
+        </p:txBody>
+      </p:sp>
+      <p:pic>
+        <p:nvPicPr>
+          <p:cNvPr id="3074" name="Picture 2" descr="C:\Users\Owner\Desktop\quiz monkey screenshots\Picture 4.png"/>
+          <p:cNvPicPr>
+            <a:picLocks noChangeAspect="1" noChangeArrowheads="1"/>
+          </p:cNvPicPr>
+          <p:nvPr/>
+        </p:nvPicPr>
+        <p:blipFill>
+          <a:blip r:embed="rId2"/>
+          <a:srcRect/>
+          <a:stretch>
+            <a:fillRect/>
+          </a:stretch>
+        </p:blipFill>
+        <p:spPr bwMode="auto">
+          <a:xfrm>
+            <a:off x="714375" y="1433513"/>
+            <a:ext cx="7715250" cy="3990975"/>
+          </a:xfrm>
+          <a:prstGeom prst="rect">
+            <a:avLst/>
+          </a:prstGeom>
+          <a:noFill/>
+        </p:spPr>
+      </p:pic>
     </p:spTree>
   </p:cSld>
   <p:clrMapOvr>
@@ -3915,7 +4031,7 @@
                 <a:latin typeface="Arial" pitchFamily="34" charset="0"/>
                 <a:cs typeface="Arial" pitchFamily="34" charset="0"/>
               </a:rPr>
-              <a:t>Title</a:t>
+              <a:t>Partial Credit</a:t>
             </a:r>
             <a:endParaRPr lang="en-US" dirty="0">
               <a:effectLst>
@@ -3931,72 +4047,56 @@
           </a:p>
         </p:txBody>
       </p:sp>
+      <p:sp>
+        <p:nvSpPr>
+          <p:cNvPr id="3" name="Slide Number Placeholder 2"/>
+          <p:cNvSpPr>
+            <a:spLocks noGrp="1"/>
+          </p:cNvSpPr>
+          <p:nvPr>
+            <p:ph type="sldNum" sz="quarter" idx="12"/>
+          </p:nvPr>
+        </p:nvSpPr>
+        <p:spPr/>
+        <p:txBody>
+          <a:bodyPr/>
+          <a:lstStyle/>
+          <a:p>
+            <a:fld id="{4A5A7388-53DE-DF4C-B882-890D8596A7FC}" type="slidenum">
+              <a:rPr lang="en-US" smtClean="0"/>
+              <a:pPr/>
+              <a:t>12</a:t>
+            </a:fld>
+            <a:endParaRPr lang="en-US"/>
+          </a:p>
+        </p:txBody>
+      </p:sp>
       <p:pic>
         <p:nvPicPr>
-          <p:cNvPr id="5" name="Picture 4" descr="Pic-BackGround.png"/>
+          <p:cNvPr id="4098" name="Picture 2" descr="C:\Users\Owner\Desktop\quiz monkey screenshots\Picture 5.png"/>
           <p:cNvPicPr>
-            <a:picLocks noChangeAspect="1"/>
+            <a:picLocks noChangeAspect="1" noChangeArrowheads="1"/>
           </p:cNvPicPr>
           <p:nvPr/>
         </p:nvPicPr>
         <p:blipFill>
           <a:blip r:embed="rId2"/>
+          <a:srcRect/>
           <a:stretch>
             <a:fillRect/>
           </a:stretch>
         </p:blipFill>
-        <p:spPr>
+        <p:spPr bwMode="auto">
           <a:xfrm>
-            <a:off x="924210" y="1954403"/>
-            <a:ext cx="7172040" cy="3981260"/>
-          </a:xfrm>
-          <a:prstGeom prst="rect">
-            <a:avLst/>
-          </a:prstGeom>
-        </p:spPr>
-      </p:pic>
-      <p:sp>
-        <p:nvSpPr>
-          <p:cNvPr id="7" name="TextBox 6"/>
-          <p:cNvSpPr txBox="1"/>
-          <p:nvPr/>
-        </p:nvSpPr>
-        <p:spPr>
-          <a:xfrm>
-            <a:off x="1800225" y="2466975"/>
-            <a:ext cx="5095875" cy="646331"/>
+            <a:off x="785813" y="1443038"/>
+            <a:ext cx="7572375" cy="3971925"/>
           </a:xfrm>
           <a:prstGeom prst="rect">
             <a:avLst/>
           </a:prstGeom>
           <a:noFill/>
         </p:spPr>
-        <p:txBody>
-          <a:bodyPr wrap="square" rtlCol="0">
-            <a:spAutoFit/>
-          </a:bodyPr>
-          <a:lstStyle/>
-          <a:p>
-            <a:r>
-              <a:rPr lang="en-US" dirty="0" smtClean="0">
-                <a:solidFill>
-                  <a:schemeClr val="bg1"/>
-                </a:solidFill>
-                <a:latin typeface="Comic Sans MS" pitchFamily="66" charset="0"/>
-              </a:rPr>
-              <a:t>-STUFF written on a chalkboard</a:t>
-            </a:r>
-          </a:p>
-          <a:p>
-            <a:endParaRPr lang="en-US" dirty="0">
-              <a:solidFill>
-                <a:schemeClr val="bg1"/>
-              </a:solidFill>
-              <a:latin typeface="Comic Sans MS" pitchFamily="66" charset="0"/>
-            </a:endParaRPr>
-          </a:p>
-        </p:txBody>
-      </p:sp>
+      </p:pic>
     </p:spTree>
   </p:cSld>
   <p:clrMapOvr>
@@ -4039,41 +4139,616 @@
             <p:ph type="title"/>
           </p:nvPr>
         </p:nvSpPr>
+        <p:spPr>
+          <a:xfrm>
+            <a:off x="457200" y="0"/>
+            <a:ext cx="8229600" cy="1143000"/>
+          </a:xfrm>
+        </p:spPr>
+        <p:txBody>
+          <a:bodyPr/>
+          <a:lstStyle/>
+          <a:p>
+            <a:r>
+              <a:rPr lang="en-US" dirty="0" smtClean="0">
+                <a:effectLst>
+                  <a:outerShdw blurRad="50800" dist="38100" algn="l" rotWithShape="0">
+                    <a:prstClr val="black">
+                      <a:alpha val="40000"/>
+                    </a:prstClr>
+                  </a:outerShdw>
+                </a:effectLst>
+                <a:latin typeface="Arial" pitchFamily="34" charset="0"/>
+                <a:cs typeface="Arial" pitchFamily="34" charset="0"/>
+              </a:rPr>
+              <a:t>Needs significant improvement</a:t>
+            </a:r>
+            <a:endParaRPr lang="en-US" dirty="0">
+              <a:effectLst>
+                <a:outerShdw blurRad="50800" dist="38100" algn="l" rotWithShape="0">
+                  <a:prstClr val="black">
+                    <a:alpha val="40000"/>
+                  </a:prstClr>
+                </a:outerShdw>
+              </a:effectLst>
+              <a:latin typeface="Arial" pitchFamily="34" charset="0"/>
+              <a:cs typeface="Arial" pitchFamily="34" charset="0"/>
+            </a:endParaRPr>
+          </a:p>
+        </p:txBody>
+      </p:sp>
+      <p:sp>
+        <p:nvSpPr>
+          <p:cNvPr id="3" name="Slide Number Placeholder 2"/>
+          <p:cNvSpPr>
+            <a:spLocks noGrp="1"/>
+          </p:cNvSpPr>
+          <p:nvPr>
+            <p:ph type="sldNum" sz="quarter" idx="12"/>
+          </p:nvPr>
+        </p:nvSpPr>
         <p:spPr/>
         <p:txBody>
           <a:bodyPr/>
           <a:lstStyle/>
           <a:p>
+            <a:fld id="{4A5A7388-53DE-DF4C-B882-890D8596A7FC}" type="slidenum">
+              <a:rPr lang="en-US" smtClean="0"/>
+              <a:pPr/>
+              <a:t>13</a:t>
+            </a:fld>
             <a:endParaRPr lang="en-US"/>
           </a:p>
         </p:txBody>
       </p:sp>
       <p:pic>
         <p:nvPicPr>
-          <p:cNvPr id="4" name="Content Placeholder 3" descr="mainMenuView.png"/>
+          <p:cNvPr id="5122" name="Picture 2" descr="C:\Users\Owner\Desktop\quiz monkey screenshots\Picture 6.png"/>
           <p:cNvPicPr>
-            <a:picLocks noGrp="1" noChangeAspect="1"/>
+            <a:picLocks noChangeAspect="1" noChangeArrowheads="1"/>
           </p:cNvPicPr>
-          <p:nvPr>
-            <p:ph idx="1"/>
-          </p:nvPr>
+          <p:nvPr/>
         </p:nvPicPr>
         <p:blipFill>
           <a:blip r:embed="rId2"/>
+          <a:srcRect/>
           <a:stretch>
             <a:fillRect/>
           </a:stretch>
         </p:blipFill>
+        <p:spPr bwMode="auto">
+          <a:xfrm>
+            <a:off x="538163" y="1319213"/>
+            <a:ext cx="8067675" cy="4219575"/>
+          </a:xfrm>
+          <a:prstGeom prst="rect">
+            <a:avLst/>
+          </a:prstGeom>
+          <a:noFill/>
+        </p:spPr>
+      </p:pic>
+    </p:spTree>
+  </p:cSld>
+  <p:clrMapOvr>
+    <a:masterClrMapping/>
+  </p:clrMapOvr>
+  <p:timing>
+    <p:tnLst>
+      <p:par>
+        <p:cTn id="1" dur="indefinite" restart="never" nodeType="tmRoot"/>
+      </p:par>
+    </p:tnLst>
+  </p:timing>
+</p:sld>
+</file>
+
+<file path=ppt/slides/slide14.xml><?xml version="1.0" encoding="utf-8"?>
+<p:sld xmlns:a="http://schemas.openxmlformats.org/drawingml/2006/main" xmlns:r="http://schemas.openxmlformats.org/officeDocument/2006/relationships" xmlns:p="http://schemas.openxmlformats.org/presentationml/2006/main">
+  <p:cSld>
+    <p:spTree>
+      <p:nvGrpSpPr>
+        <p:cNvPr id="1" name=""/>
+        <p:cNvGrpSpPr/>
+        <p:nvPr/>
+      </p:nvGrpSpPr>
+      <p:grpSpPr>
+        <a:xfrm>
+          <a:off x="0" y="0"/>
+          <a:ext cx="0" cy="0"/>
+          <a:chOff x="0" y="0"/>
+          <a:chExt cx="0" cy="0"/>
+        </a:xfrm>
+      </p:grpSpPr>
+      <p:sp>
+        <p:nvSpPr>
+          <p:cNvPr id="2" name="Title 1"/>
+          <p:cNvSpPr>
+            <a:spLocks noGrp="1"/>
+          </p:cNvSpPr>
+          <p:nvPr>
+            <p:ph type="title"/>
+          </p:nvPr>
+        </p:nvSpPr>
         <p:spPr>
           <a:xfrm>
-            <a:off x="991047" y="1872705"/>
-            <a:ext cx="7161905" cy="3980953"/>
+            <a:off x="457200" y="0"/>
+            <a:ext cx="8229600" cy="1143000"/>
+          </a:xfrm>
+        </p:spPr>
+        <p:txBody>
+          <a:bodyPr/>
+          <a:lstStyle/>
+          <a:p>
+            <a:r>
+              <a:rPr lang="en-US" dirty="0" smtClean="0">
+                <a:effectLst>
+                  <a:outerShdw blurRad="50800" dist="38100" algn="l" rotWithShape="0">
+                    <a:prstClr val="black">
+                      <a:alpha val="40000"/>
+                    </a:prstClr>
+                  </a:outerShdw>
+                </a:effectLst>
+                <a:latin typeface="Arial" pitchFamily="34" charset="0"/>
+                <a:cs typeface="Arial" pitchFamily="34" charset="0"/>
+              </a:rPr>
+              <a:t>But don’t take too long…</a:t>
+            </a:r>
+            <a:endParaRPr lang="en-US" dirty="0">
+              <a:effectLst>
+                <a:outerShdw blurRad="50800" dist="38100" algn="l" rotWithShape="0">
+                  <a:prstClr val="black">
+                    <a:alpha val="40000"/>
+                  </a:prstClr>
+                </a:outerShdw>
+              </a:effectLst>
+              <a:latin typeface="Arial" pitchFamily="34" charset="0"/>
+              <a:cs typeface="Arial" pitchFamily="34" charset="0"/>
+            </a:endParaRPr>
+          </a:p>
+        </p:txBody>
+      </p:sp>
+      <p:sp>
+        <p:nvSpPr>
+          <p:cNvPr id="3" name="Slide Number Placeholder 2"/>
+          <p:cNvSpPr>
+            <a:spLocks noGrp="1"/>
+          </p:cNvSpPr>
+          <p:nvPr>
+            <p:ph type="sldNum" sz="quarter" idx="12"/>
+          </p:nvPr>
+        </p:nvSpPr>
+        <p:spPr/>
+        <p:txBody>
+          <a:bodyPr/>
+          <a:lstStyle/>
+          <a:p>
+            <a:fld id="{4A5A7388-53DE-DF4C-B882-890D8596A7FC}" type="slidenum">
+              <a:rPr lang="en-US" smtClean="0"/>
+              <a:pPr/>
+              <a:t>14</a:t>
+            </a:fld>
+            <a:endParaRPr lang="en-US"/>
+          </a:p>
+        </p:txBody>
+      </p:sp>
+      <p:grpSp>
+        <p:nvGrpSpPr>
+          <p:cNvPr id="8" name="Group 7"/>
+          <p:cNvGrpSpPr/>
+          <p:nvPr/>
+        </p:nvGrpSpPr>
+        <p:grpSpPr>
+          <a:xfrm>
+            <a:off x="657225" y="1343025"/>
+            <a:ext cx="7829550" cy="4171950"/>
+            <a:chOff x="657225" y="1343025"/>
+            <a:chExt cx="7829550" cy="4171950"/>
+          </a:xfrm>
+        </p:grpSpPr>
+        <p:sp>
+          <p:nvSpPr>
+            <p:cNvPr id="7" name="Rectangle 6"/>
+            <p:cNvSpPr/>
+            <p:nvPr/>
+          </p:nvSpPr>
+          <p:spPr>
+            <a:xfrm>
+              <a:off x="1542197" y="1665027"/>
+              <a:ext cx="6005015" cy="3248167"/>
+            </a:xfrm>
+            <a:prstGeom prst="rect">
+              <a:avLst/>
+            </a:prstGeom>
+            <a:solidFill>
+              <a:schemeClr val="bg1"/>
+            </a:solidFill>
+            <a:ln>
+              <a:solidFill>
+                <a:schemeClr val="bg1"/>
+              </a:solidFill>
+            </a:ln>
+          </p:spPr>
+          <p:style>
+            <a:lnRef idx="1">
+              <a:schemeClr val="accent1"/>
+            </a:lnRef>
+            <a:fillRef idx="3">
+              <a:schemeClr val="accent1"/>
+            </a:fillRef>
+            <a:effectRef idx="2">
+              <a:schemeClr val="accent1"/>
+            </a:effectRef>
+            <a:fontRef idx="minor">
+              <a:schemeClr val="lt1"/>
+            </a:fontRef>
+          </p:style>
+          <p:txBody>
+            <a:bodyPr rtlCol="0" anchor="ctr"/>
+            <a:lstStyle/>
+            <a:p>
+              <a:pPr algn="ctr"/>
+              <a:endParaRPr lang="en-CA"/>
+            </a:p>
+          </p:txBody>
+        </p:sp>
+        <p:pic>
+          <p:nvPicPr>
+            <p:cNvPr id="6147" name="Picture 3"/>
+            <p:cNvPicPr>
+              <a:picLocks noChangeAspect="1" noChangeArrowheads="1"/>
+            </p:cNvPicPr>
+            <p:nvPr/>
+          </p:nvPicPr>
+          <p:blipFill>
+            <a:blip r:embed="rId2">
+              <a:clrChange>
+                <a:clrFrom>
+                  <a:srgbClr val="FFFFFF"/>
+                </a:clrFrom>
+                <a:clrTo>
+                  <a:srgbClr val="FFFFFF">
+                    <a:alpha val="0"/>
+                  </a:srgbClr>
+                </a:clrTo>
+              </a:clrChange>
+            </a:blip>
+            <a:srcRect/>
+            <a:stretch>
+              <a:fillRect/>
+            </a:stretch>
+          </p:blipFill>
+          <p:spPr bwMode="auto">
+            <a:xfrm>
+              <a:off x="657225" y="1343025"/>
+              <a:ext cx="7829550" cy="4171950"/>
+            </a:xfrm>
+            <a:prstGeom prst="rect">
+              <a:avLst/>
+            </a:prstGeom>
+            <a:noFill/>
+            <a:ln w="9525">
+              <a:noFill/>
+              <a:miter lim="800000"/>
+              <a:headEnd/>
+              <a:tailEnd/>
+            </a:ln>
+          </p:spPr>
+        </p:pic>
+      </p:grpSp>
+    </p:spTree>
+  </p:cSld>
+  <p:clrMapOvr>
+    <a:masterClrMapping/>
+  </p:clrMapOvr>
+  <p:timing>
+    <p:tnLst>
+      <p:par>
+        <p:cTn id="1" dur="indefinite" restart="never" nodeType="tmRoot"/>
+      </p:par>
+    </p:tnLst>
+  </p:timing>
+</p:sld>
+</file>
+
+<file path=ppt/slides/slide15.xml><?xml version="1.0" encoding="utf-8"?>
+<p:sld xmlns:a="http://schemas.openxmlformats.org/drawingml/2006/main" xmlns:r="http://schemas.openxmlformats.org/officeDocument/2006/relationships" xmlns:p="http://schemas.openxmlformats.org/presentationml/2006/main">
+  <p:cSld>
+    <p:spTree>
+      <p:nvGrpSpPr>
+        <p:cNvPr id="1" name=""/>
+        <p:cNvGrpSpPr/>
+        <p:nvPr/>
+      </p:nvGrpSpPr>
+      <p:grpSpPr>
+        <a:xfrm>
+          <a:off x="0" y="0"/>
+          <a:ext cx="0" cy="0"/>
+          <a:chOff x="0" y="0"/>
+          <a:chExt cx="0" cy="0"/>
+        </a:xfrm>
+      </p:grpSpPr>
+      <p:sp>
+        <p:nvSpPr>
+          <p:cNvPr id="2" name="Title 1"/>
+          <p:cNvSpPr>
+            <a:spLocks noGrp="1"/>
+          </p:cNvSpPr>
+          <p:nvPr>
+            <p:ph type="title"/>
+          </p:nvPr>
+        </p:nvSpPr>
+        <p:spPr>
+          <a:xfrm>
+            <a:off x="457200" y="0"/>
+            <a:ext cx="8229600" cy="1143000"/>
+          </a:xfrm>
+        </p:spPr>
+        <p:txBody>
+          <a:bodyPr/>
+          <a:lstStyle/>
+          <a:p>
+            <a:r>
+              <a:rPr lang="en-US" dirty="0" smtClean="0">
+                <a:effectLst>
+                  <a:outerShdw blurRad="50800" dist="38100" algn="l" rotWithShape="0">
+                    <a:prstClr val="black">
+                      <a:alpha val="40000"/>
+                    </a:prstClr>
+                  </a:outerShdw>
+                </a:effectLst>
+                <a:latin typeface="Arial" pitchFamily="34" charset="0"/>
+                <a:cs typeface="Arial" pitchFamily="34" charset="0"/>
+              </a:rPr>
+              <a:t>…or else you fail!</a:t>
+            </a:r>
+            <a:endParaRPr lang="en-US" dirty="0">
+              <a:effectLst>
+                <a:outerShdw blurRad="50800" dist="38100" algn="l" rotWithShape="0">
+                  <a:prstClr val="black">
+                    <a:alpha val="40000"/>
+                  </a:prstClr>
+                </a:outerShdw>
+              </a:effectLst>
+              <a:latin typeface="Arial" pitchFamily="34" charset="0"/>
+              <a:cs typeface="Arial" pitchFamily="34" charset="0"/>
+            </a:endParaRPr>
+          </a:p>
+        </p:txBody>
+      </p:sp>
+      <p:sp>
+        <p:nvSpPr>
+          <p:cNvPr id="3" name="Slide Number Placeholder 2"/>
+          <p:cNvSpPr>
+            <a:spLocks noGrp="1"/>
+          </p:cNvSpPr>
+          <p:nvPr>
+            <p:ph type="sldNum" sz="quarter" idx="12"/>
+          </p:nvPr>
+        </p:nvSpPr>
+        <p:spPr/>
+        <p:txBody>
+          <a:bodyPr/>
+          <a:lstStyle/>
+          <a:p>
+            <a:fld id="{4A5A7388-53DE-DF4C-B882-890D8596A7FC}" type="slidenum">
+              <a:rPr lang="en-US" smtClean="0"/>
+              <a:pPr/>
+              <a:t>15</a:t>
+            </a:fld>
+            <a:endParaRPr lang="en-US"/>
+          </a:p>
+        </p:txBody>
+      </p:sp>
+      <p:pic>
+        <p:nvPicPr>
+          <p:cNvPr id="7170" name="Picture 2" descr="C:\Users\Owner\Desktop\quiz monkey screenshots\Picture 8.png"/>
+          <p:cNvPicPr>
+            <a:picLocks noChangeAspect="1" noChangeArrowheads="1"/>
+          </p:cNvPicPr>
+          <p:nvPr/>
+        </p:nvPicPr>
+        <p:blipFill>
+          <a:blip r:embed="rId2"/>
+          <a:srcRect/>
+          <a:stretch>
+            <a:fillRect/>
+          </a:stretch>
+        </p:blipFill>
+        <p:spPr bwMode="auto">
+          <a:xfrm>
+            <a:off x="657225" y="1855479"/>
+            <a:ext cx="7800975" cy="3924300"/>
+          </a:xfrm>
+          <a:prstGeom prst="rect">
+            <a:avLst/>
+          </a:prstGeom>
+          <a:noFill/>
+        </p:spPr>
+      </p:pic>
+    </p:spTree>
+  </p:cSld>
+  <p:clrMapOvr>
+    <a:masterClrMapping/>
+  </p:clrMapOvr>
+  <p:timing>
+    <p:tnLst>
+      <p:par>
+        <p:cTn id="1" dur="indefinite" restart="never" nodeType="tmRoot"/>
+      </p:par>
+    </p:tnLst>
+  </p:timing>
+</p:sld>
+</file>
+
+<file path=ppt/slides/slide16.xml><?xml version="1.0" encoding="utf-8"?>
+<p:sld xmlns:a="http://schemas.openxmlformats.org/drawingml/2006/main" xmlns:r="http://schemas.openxmlformats.org/officeDocument/2006/relationships" xmlns:p="http://schemas.openxmlformats.org/presentationml/2006/main">
+  <p:cSld>
+    <p:spTree>
+      <p:nvGrpSpPr>
+        <p:cNvPr id="1" name=""/>
+        <p:cNvGrpSpPr/>
+        <p:nvPr/>
+      </p:nvGrpSpPr>
+      <p:grpSpPr>
+        <a:xfrm>
+          <a:off x="0" y="0"/>
+          <a:ext cx="0" cy="0"/>
+          <a:chOff x="0" y="0"/>
+          <a:chExt cx="0" cy="0"/>
+        </a:xfrm>
+      </p:grpSpPr>
+      <p:sp>
+        <p:nvSpPr>
+          <p:cNvPr id="2" name="Title 1"/>
+          <p:cNvSpPr>
+            <a:spLocks noGrp="1"/>
+          </p:cNvSpPr>
+          <p:nvPr>
+            <p:ph type="title"/>
+          </p:nvPr>
+        </p:nvSpPr>
+        <p:spPr>
+          <a:xfrm>
+            <a:off x="457200" y="0"/>
+            <a:ext cx="8229600" cy="1143000"/>
+          </a:xfrm>
+        </p:spPr>
+        <p:txBody>
+          <a:bodyPr>
+            <a:normAutofit fontScale="90000"/>
+          </a:bodyPr>
+          <a:lstStyle/>
+          <a:p>
+            <a:r>
+              <a:rPr lang="en-US" dirty="0" smtClean="0">
+                <a:effectLst>
+                  <a:outerShdw blurRad="50800" dist="38100" algn="l" rotWithShape="0">
+                    <a:prstClr val="black">
+                      <a:alpha val="40000"/>
+                    </a:prstClr>
+                  </a:outerShdw>
+                </a:effectLst>
+                <a:latin typeface="Arial" pitchFamily="34" charset="0"/>
+                <a:cs typeface="Arial" pitchFamily="34" charset="0"/>
+              </a:rPr>
+              <a:t>We hope you buy our program…</a:t>
+            </a:r>
+            <a:endParaRPr lang="en-US" dirty="0">
+              <a:effectLst>
+                <a:outerShdw blurRad="50800" dist="38100" algn="l" rotWithShape="0">
+                  <a:prstClr val="black">
+                    <a:alpha val="40000"/>
+                  </a:prstClr>
+                </a:outerShdw>
+              </a:effectLst>
+              <a:latin typeface="Arial" pitchFamily="34" charset="0"/>
+              <a:cs typeface="Arial" pitchFamily="34" charset="0"/>
+            </a:endParaRPr>
+          </a:p>
+        </p:txBody>
+      </p:sp>
+      <p:sp>
+        <p:nvSpPr>
+          <p:cNvPr id="3" name="Slide Number Placeholder 2"/>
+          <p:cNvSpPr>
+            <a:spLocks noGrp="1"/>
+          </p:cNvSpPr>
+          <p:nvPr>
+            <p:ph type="sldNum" sz="quarter" idx="12"/>
+          </p:nvPr>
+        </p:nvSpPr>
+        <p:spPr/>
+        <p:txBody>
+          <a:bodyPr/>
+          <a:lstStyle/>
+          <a:p>
+            <a:fld id="{4A5A7388-53DE-DF4C-B882-890D8596A7FC}" type="slidenum">
+              <a:rPr lang="en-US" smtClean="0"/>
+              <a:pPr/>
+              <a:t>16</a:t>
+            </a:fld>
+            <a:endParaRPr lang="en-US"/>
+          </a:p>
+        </p:txBody>
+      </p:sp>
+      <p:sp>
+        <p:nvSpPr>
+          <p:cNvPr id="5" name="Title 1"/>
+          <p:cNvSpPr txBox="1">
+            <a:spLocks/>
+          </p:cNvSpPr>
+          <p:nvPr/>
+        </p:nvSpPr>
+        <p:spPr>
+          <a:xfrm>
+            <a:off x="457200" y="2911012"/>
+            <a:ext cx="8229600" cy="1143000"/>
           </a:xfrm>
           <a:prstGeom prst="rect">
             <a:avLst/>
           </a:prstGeom>
         </p:spPr>
-      </p:pic>
+        <p:txBody>
+          <a:bodyPr vert="horz" lIns="91440" tIns="45720" rIns="91440" bIns="45720" rtlCol="0" anchor="ctr">
+            <a:normAutofit fontScale="97500"/>
+          </a:bodyPr>
+          <a:lstStyle/>
+          <a:p>
+            <a:pPr marL="0" marR="0" lvl="0" indent="0" algn="ctr" defTabSz="457200" rtl="0" eaLnBrk="1" fontAlgn="auto" latinLnBrk="0" hangingPunct="1">
+              <a:lnSpc>
+                <a:spcPct val="100000"/>
+              </a:lnSpc>
+              <a:spcBef>
+                <a:spcPct val="0"/>
+              </a:spcBef>
+              <a:spcAft>
+                <a:spcPts val="0"/>
+              </a:spcAft>
+              <a:buClrTx/>
+              <a:buSzTx/>
+              <a:buFontTx/>
+              <a:buNone/>
+              <a:tabLst/>
+              <a:defRPr/>
+            </a:pPr>
+            <a:r>
+              <a:rPr lang="en-US" sz="4400" dirty="0" smtClean="0">
+                <a:effectLst>
+                  <a:outerShdw blurRad="50800" dist="38100" algn="l" rotWithShape="0">
+                    <a:prstClr val="black">
+                      <a:alpha val="40000"/>
+                    </a:prstClr>
+                  </a:outerShdw>
+                </a:effectLst>
+                <a:latin typeface="Arial" pitchFamily="34" charset="0"/>
+                <a:ea typeface="+mj-ea"/>
+                <a:cs typeface="Arial" pitchFamily="34" charset="0"/>
+              </a:rPr>
+              <a:t>Any questions?</a:t>
+            </a:r>
+            <a:endParaRPr kumimoji="0" lang="en-US" sz="4400" b="0" i="0" u="none" strike="noStrike" kern="1200" cap="none" spc="0" normalizeH="0" baseline="0" noProof="0" dirty="0">
+              <a:ln>
+                <a:noFill/>
+              </a:ln>
+              <a:solidFill>
+                <a:schemeClr val="tx1"/>
+              </a:solidFill>
+              <a:effectLst>
+                <a:outerShdw blurRad="50800" dist="38100" algn="l" rotWithShape="0">
+                  <a:prstClr val="black">
+                    <a:alpha val="40000"/>
+                  </a:prstClr>
+                </a:outerShdw>
+              </a:effectLst>
+              <a:uLnTx/>
+              <a:uFillTx/>
+              <a:latin typeface="Arial" pitchFamily="34" charset="0"/>
+              <a:ea typeface="+mj-ea"/>
+              <a:cs typeface="Arial" pitchFamily="34" charset="0"/>
+            </a:endParaRPr>
+          </a:p>
+        </p:txBody>
+      </p:sp>
     </p:spTree>
   </p:cSld>
   <p:clrMapOvr>
@@ -4655,6 +5330,30 @@
               <a:t>http://code.google.com/p/cmpt275group11/</a:t>
             </a:r>
             <a:endParaRPr lang="en-US" sz="1600" dirty="0"/>
+          </a:p>
+        </p:txBody>
+      </p:sp>
+      <p:sp>
+        <p:nvSpPr>
+          <p:cNvPr id="20" name="Slide Number Placeholder 19"/>
+          <p:cNvSpPr>
+            <a:spLocks noGrp="1"/>
+          </p:cNvSpPr>
+          <p:nvPr>
+            <p:ph type="sldNum" sz="quarter" idx="12"/>
+          </p:nvPr>
+        </p:nvSpPr>
+        <p:spPr/>
+        <p:txBody>
+          <a:bodyPr/>
+          <a:lstStyle/>
+          <a:p>
+            <a:fld id="{4A5A7388-53DE-DF4C-B882-890D8596A7FC}" type="slidenum">
+              <a:rPr lang="en-US" smtClean="0"/>
+              <a:pPr/>
+              <a:t>2</a:t>
+            </a:fld>
+            <a:endParaRPr lang="en-US"/>
           </a:p>
         </p:txBody>
       </p:sp>
@@ -5677,97 +6376,149 @@
           </a:p>
         </p:txBody>
       </p:sp>
-      <p:pic>
-        <p:nvPicPr>
-          <p:cNvPr id="6" name="Picture 2" descr="C:\Documents and Settings\cleyt\Local Settings\Temporary Internet Files\Content.IE5\6KAPL56J\MCj04417060000[1].png"/>
-          <p:cNvPicPr>
-            <a:picLocks noChangeAspect="1" noChangeArrowheads="1"/>
-          </p:cNvPicPr>
+      <p:grpSp>
+        <p:nvGrpSpPr>
+          <p:cNvPr id="47" name="Group 46"/>
+          <p:cNvGrpSpPr/>
           <p:nvPr/>
-        </p:nvPicPr>
-        <p:blipFill>
-          <a:blip r:embed="rId3" cstate="print"/>
-          <a:srcRect/>
-          <a:stretch>
-            <a:fillRect/>
-          </a:stretch>
-        </p:blipFill>
-        <p:spPr bwMode="auto">
+        </p:nvGrpSpPr>
+        <p:grpSpPr>
           <a:xfrm>
-            <a:off x="5963396" y="2905836"/>
-            <a:ext cx="1905000" cy="1905000"/>
+            <a:off x="857996" y="2829636"/>
+            <a:ext cx="7010400" cy="2354997"/>
+            <a:chOff x="857996" y="2829636"/>
+            <a:chExt cx="7010400" cy="2354997"/>
           </a:xfrm>
-          <a:prstGeom prst="rect">
-            <a:avLst/>
-          </a:prstGeom>
-          <a:noFill/>
-        </p:spPr>
-      </p:pic>
-      <p:pic>
-        <p:nvPicPr>
-          <p:cNvPr id="7" name="Picture 4" descr="C:\Documents and Settings\cleyt\Local Settings\Temporary Internet Files\Content.IE5\GXC8DC2R\MCj04368950000[1].png"/>
-          <p:cNvPicPr>
-            <a:picLocks noChangeAspect="1" noChangeArrowheads="1"/>
-          </p:cNvPicPr>
-          <p:nvPr/>
-        </p:nvPicPr>
-        <p:blipFill>
-          <a:blip r:embed="rId4" cstate="print"/>
-          <a:srcRect/>
-          <a:stretch>
-            <a:fillRect/>
-          </a:stretch>
-        </p:blipFill>
-        <p:spPr bwMode="auto">
-          <a:xfrm>
-            <a:off x="857996" y="3174262"/>
-            <a:ext cx="1714500" cy="1714500"/>
-          </a:xfrm>
-          <a:prstGeom prst="rect">
-            <a:avLst/>
-          </a:prstGeom>
-          <a:noFill/>
-        </p:spPr>
-      </p:pic>
-      <p:sp>
-        <p:nvSpPr>
-          <p:cNvPr id="8" name="Rectangle 7"/>
-          <p:cNvSpPr/>
-          <p:nvPr/>
-        </p:nvSpPr>
-        <p:spPr>
-          <a:xfrm>
-            <a:off x="2073476" y="2829636"/>
-            <a:ext cx="3267241" cy="830997"/>
-          </a:xfrm>
-          <a:prstGeom prst="rect">
-            <a:avLst/>
-          </a:prstGeom>
-          <a:noFill/>
-        </p:spPr>
-        <p:txBody>
-          <a:bodyPr wrap="none" lIns="91440" tIns="45720" rIns="91440" bIns="45720">
-            <a:spAutoFit/>
-            <a:scene3d>
-              <a:camera prst="orthographicFront"/>
-              <a:lightRig rig="flat" dir="tl">
-                <a:rot lat="0" lon="0" rev="6600000"/>
-              </a:lightRig>
-            </a:scene3d>
-            <a:sp3d extrusionH="25400" contourW="8890">
-              <a:bevelT w="38100" h="31750"/>
-              <a:contourClr>
-                <a:schemeClr val="accent2">
-                  <a:shade val="75000"/>
-                </a:schemeClr>
-              </a:contourClr>
-            </a:sp3d>
-          </a:bodyPr>
-          <a:lstStyle/>
-          <a:p>
-            <a:pPr algn="ctr"/>
-            <a:r>
-              <a:rPr lang="en-US" sz="4800" b="1" dirty="0" smtClean="0">
+        </p:grpSpPr>
+        <p:pic>
+          <p:nvPicPr>
+            <p:cNvPr id="6" name="Picture 2" descr="C:\Documents and Settings\cleyt\Local Settings\Temporary Internet Files\Content.IE5\6KAPL56J\MCj04417060000[1].png"/>
+            <p:cNvPicPr>
+              <a:picLocks noChangeAspect="1" noChangeArrowheads="1"/>
+            </p:cNvPicPr>
+            <p:nvPr/>
+          </p:nvPicPr>
+          <p:blipFill>
+            <a:blip r:embed="rId3" cstate="print"/>
+            <a:srcRect/>
+            <a:stretch>
+              <a:fillRect/>
+            </a:stretch>
+          </p:blipFill>
+          <p:spPr bwMode="auto">
+            <a:xfrm>
+              <a:off x="5963396" y="2905836"/>
+              <a:ext cx="1905000" cy="1905000"/>
+            </a:xfrm>
+            <a:prstGeom prst="rect">
+              <a:avLst/>
+            </a:prstGeom>
+            <a:noFill/>
+          </p:spPr>
+        </p:pic>
+        <p:pic>
+          <p:nvPicPr>
+            <p:cNvPr id="7" name="Picture 4" descr="C:\Documents and Settings\cleyt\Local Settings\Temporary Internet Files\Content.IE5\GXC8DC2R\MCj04368950000[1].png"/>
+            <p:cNvPicPr>
+              <a:picLocks noChangeAspect="1" noChangeArrowheads="1"/>
+            </p:cNvPicPr>
+            <p:nvPr/>
+          </p:nvPicPr>
+          <p:blipFill>
+            <a:blip r:embed="rId4" cstate="print"/>
+            <a:srcRect/>
+            <a:stretch>
+              <a:fillRect/>
+            </a:stretch>
+          </p:blipFill>
+          <p:spPr bwMode="auto">
+            <a:xfrm>
+              <a:off x="857996" y="3174262"/>
+              <a:ext cx="1714500" cy="1714500"/>
+            </a:xfrm>
+            <a:prstGeom prst="rect">
+              <a:avLst/>
+            </a:prstGeom>
+            <a:noFill/>
+          </p:spPr>
+        </p:pic>
+        <p:sp>
+          <p:nvSpPr>
+            <p:cNvPr id="8" name="Rectangle 7"/>
+            <p:cNvSpPr/>
+            <p:nvPr/>
+          </p:nvSpPr>
+          <p:spPr>
+            <a:xfrm>
+              <a:off x="2073476" y="2829636"/>
+              <a:ext cx="3267241" cy="830997"/>
+            </a:xfrm>
+            <a:prstGeom prst="rect">
+              <a:avLst/>
+            </a:prstGeom>
+            <a:noFill/>
+          </p:spPr>
+          <p:txBody>
+            <a:bodyPr wrap="none" lIns="91440" tIns="45720" rIns="91440" bIns="45720">
+              <a:spAutoFit/>
+              <a:scene3d>
+                <a:camera prst="orthographicFront"/>
+                <a:lightRig rig="flat" dir="tl">
+                  <a:rot lat="0" lon="0" rev="6600000"/>
+                </a:lightRig>
+              </a:scene3d>
+              <a:sp3d extrusionH="25400" contourW="8890">
+                <a:bevelT w="38100" h="31750"/>
+                <a:contourClr>
+                  <a:schemeClr val="accent2">
+                    <a:shade val="75000"/>
+                  </a:schemeClr>
+                </a:contourClr>
+              </a:sp3d>
+            </a:bodyPr>
+            <a:lstStyle/>
+            <a:p>
+              <a:pPr algn="ctr"/>
+              <a:r>
+                <a:rPr lang="en-US" sz="4800" b="1" dirty="0" smtClean="0">
+                  <a:ln w="11430"/>
+                  <a:gradFill>
+                    <a:gsLst>
+                      <a:gs pos="0">
+                        <a:schemeClr val="accent2">
+                          <a:tint val="70000"/>
+                          <a:satMod val="245000"/>
+                        </a:schemeClr>
+                      </a:gs>
+                      <a:gs pos="75000">
+                        <a:schemeClr val="accent2">
+                          <a:tint val="90000"/>
+                          <a:shade val="60000"/>
+                          <a:satMod val="240000"/>
+                        </a:schemeClr>
+                      </a:gs>
+                      <a:gs pos="100000">
+                        <a:schemeClr val="accent2">
+                          <a:tint val="100000"/>
+                          <a:shade val="50000"/>
+                          <a:satMod val="240000"/>
+                        </a:schemeClr>
+                      </a:gs>
+                    </a:gsLst>
+                    <a:lin ang="5400000"/>
+                  </a:gradFill>
+                  <a:effectLst>
+                    <a:outerShdw blurRad="50800" dist="39000" dir="5460000" algn="tl">
+                      <a:srgbClr val="000000">
+                        <a:alpha val="38000"/>
+                      </a:srgbClr>
+                    </a:outerShdw>
+                  </a:effectLst>
+                  <a:latin typeface="Chiller" pitchFamily="82" charset="0"/>
+                </a:rPr>
+                <a:t>Hey Kids, its…</a:t>
+              </a:r>
+              <a:endParaRPr lang="en-US" sz="4800" b="1" dirty="0">
                 <a:ln w="11430"/>
                 <a:gradFill>
                   <a:gsLst>
@@ -5801,87 +6552,97 @@
                     </a:srgbClr>
                   </a:outerShdw>
                 </a:effectLst>
-                <a:latin typeface="Chiller" pitchFamily="82" charset="0"/>
-              </a:rPr>
-              <a:t>Hey Kids, its…</a:t>
-            </a:r>
-            <a:endParaRPr lang="en-US" sz="4800" b="1" dirty="0">
-              <a:ln w="11430"/>
-              <a:gradFill>
-                <a:gsLst>
-                  <a:gs pos="0">
-                    <a:schemeClr val="accent2">
-                      <a:tint val="70000"/>
-                      <a:satMod val="245000"/>
-                    </a:schemeClr>
-                  </a:gs>
-                  <a:gs pos="75000">
-                    <a:schemeClr val="accent2">
-                      <a:tint val="90000"/>
-                      <a:shade val="60000"/>
-                      <a:satMod val="240000"/>
-                    </a:schemeClr>
-                  </a:gs>
-                  <a:gs pos="100000">
-                    <a:schemeClr val="accent2">
-                      <a:tint val="100000"/>
-                      <a:shade val="50000"/>
-                      <a:satMod val="240000"/>
-                    </a:schemeClr>
-                  </a:gs>
-                </a:gsLst>
-                <a:lin ang="5400000"/>
-              </a:gradFill>
-              <a:effectLst>
-                <a:outerShdw blurRad="50800" dist="39000" dir="5460000" algn="tl">
-                  <a:srgbClr val="000000">
-                    <a:alpha val="38000"/>
-                  </a:srgbClr>
-                </a:outerShdw>
-              </a:effectLst>
-            </a:endParaRPr>
-          </a:p>
-        </p:txBody>
-      </p:sp>
-      <p:sp>
-        <p:nvSpPr>
-          <p:cNvPr id="9" name="Rectangle 8"/>
-          <p:cNvSpPr/>
-          <p:nvPr/>
-        </p:nvSpPr>
-        <p:spPr>
-          <a:xfrm>
-            <a:off x="1767302" y="3134436"/>
-            <a:ext cx="5522666" cy="1754326"/>
-          </a:xfrm>
-          <a:prstGeom prst="rect">
-            <a:avLst/>
-          </a:prstGeom>
-          <a:noFill/>
-        </p:spPr>
-        <p:txBody>
-          <a:bodyPr wrap="none" lIns="91440" tIns="45720" rIns="91440" bIns="45720">
-            <a:spAutoFit/>
-            <a:scene3d>
-              <a:camera prst="orthographicFront"/>
-              <a:lightRig rig="glow" dir="tl">
-                <a:rot lat="0" lon="0" rev="5400000"/>
-              </a:lightRig>
-            </a:scene3d>
-            <a:sp3d contourW="12700">
-              <a:bevelT w="25400" h="25400"/>
-              <a:contourClr>
-                <a:schemeClr val="accent6">
-                  <a:shade val="73000"/>
-                </a:schemeClr>
-              </a:contourClr>
-            </a:sp3d>
-          </a:bodyPr>
-          <a:lstStyle/>
-          <a:p>
-            <a:pPr algn="ctr"/>
-            <a:r>
-              <a:rPr lang="en-US" sz="10800" b="1" dirty="0" smtClean="0">
+              </a:endParaRPr>
+            </a:p>
+          </p:txBody>
+        </p:sp>
+        <p:sp>
+          <p:nvSpPr>
+            <p:cNvPr id="9" name="Rectangle 8"/>
+            <p:cNvSpPr/>
+            <p:nvPr/>
+          </p:nvSpPr>
+          <p:spPr>
+            <a:xfrm>
+              <a:off x="1767302" y="3134436"/>
+              <a:ext cx="5522666" cy="1754326"/>
+            </a:xfrm>
+            <a:prstGeom prst="rect">
+              <a:avLst/>
+            </a:prstGeom>
+            <a:noFill/>
+          </p:spPr>
+          <p:txBody>
+            <a:bodyPr wrap="none" lIns="91440" tIns="45720" rIns="91440" bIns="45720">
+              <a:spAutoFit/>
+              <a:scene3d>
+                <a:camera prst="orthographicFront"/>
+                <a:lightRig rig="glow" dir="tl">
+                  <a:rot lat="0" lon="0" rev="5400000"/>
+                </a:lightRig>
+              </a:scene3d>
+              <a:sp3d contourW="12700">
+                <a:bevelT w="25400" h="25400"/>
+                <a:contourClr>
+                  <a:schemeClr val="accent6">
+                    <a:shade val="73000"/>
+                  </a:schemeClr>
+                </a:contourClr>
+              </a:sp3d>
+            </a:bodyPr>
+            <a:lstStyle/>
+            <a:p>
+              <a:pPr algn="ctr"/>
+              <a:r>
+                <a:rPr lang="en-US" sz="10800" b="1" dirty="0" smtClean="0">
+                  <a:ln w="11430"/>
+                  <a:gradFill>
+                    <a:gsLst>
+                      <a:gs pos="0">
+                        <a:schemeClr val="accent6">
+                          <a:tint val="90000"/>
+                          <a:satMod val="120000"/>
+                        </a:schemeClr>
+                      </a:gs>
+                      <a:gs pos="25000">
+                        <a:schemeClr val="accent6">
+                          <a:tint val="93000"/>
+                          <a:satMod val="120000"/>
+                        </a:schemeClr>
+                      </a:gs>
+                      <a:gs pos="50000">
+                        <a:schemeClr val="accent6">
+                          <a:shade val="89000"/>
+                          <a:satMod val="110000"/>
+                        </a:schemeClr>
+                      </a:gs>
+                      <a:gs pos="75000">
+                        <a:schemeClr val="accent6">
+                          <a:tint val="93000"/>
+                          <a:satMod val="120000"/>
+                        </a:schemeClr>
+                      </a:gs>
+                      <a:gs pos="100000">
+                        <a:schemeClr val="accent6">
+                          <a:tint val="90000"/>
+                          <a:satMod val="120000"/>
+                        </a:schemeClr>
+                      </a:gs>
+                    </a:gsLst>
+                    <a:lin ang="5400000"/>
+                  </a:gradFill>
+                  <a:effectLst>
+                    <a:outerShdw blurRad="80000" dist="40000" dir="5040000" algn="tl">
+                      <a:srgbClr val="000000">
+                        <a:alpha val="30000"/>
+                      </a:srgbClr>
+                    </a:outerShdw>
+                  </a:effectLst>
+                  <a:latin typeface="Chiller" pitchFamily="82" charset="0"/>
+                </a:rPr>
+                <a:t>Quiz Monkey</a:t>
+              </a:r>
+              <a:endParaRPr lang="en-US" sz="10800" b="1" dirty="0">
                 <a:ln w="11430"/>
                 <a:gradFill>
                   <a:gsLst>
@@ -5926,97 +6687,87 @@
                   </a:outerShdw>
                 </a:effectLst>
                 <a:latin typeface="Chiller" pitchFamily="82" charset="0"/>
-              </a:rPr>
-              <a:t>Quiz Monkey</a:t>
-            </a:r>
-            <a:endParaRPr lang="en-US" sz="10800" b="1" dirty="0">
-              <a:ln w="11430"/>
-              <a:gradFill>
-                <a:gsLst>
-                  <a:gs pos="0">
-                    <a:schemeClr val="accent6">
-                      <a:tint val="90000"/>
-                      <a:satMod val="120000"/>
-                    </a:schemeClr>
-                  </a:gs>
-                  <a:gs pos="25000">
-                    <a:schemeClr val="accent6">
-                      <a:tint val="93000"/>
-                      <a:satMod val="120000"/>
-                    </a:schemeClr>
-                  </a:gs>
-                  <a:gs pos="50000">
-                    <a:schemeClr val="accent6">
-                      <a:shade val="89000"/>
-                      <a:satMod val="110000"/>
-                    </a:schemeClr>
-                  </a:gs>
-                  <a:gs pos="75000">
-                    <a:schemeClr val="accent6">
-                      <a:tint val="93000"/>
-                      <a:satMod val="120000"/>
-                    </a:schemeClr>
-                  </a:gs>
-                  <a:gs pos="100000">
-                    <a:schemeClr val="accent6">
-                      <a:tint val="90000"/>
-                      <a:satMod val="120000"/>
-                    </a:schemeClr>
-                  </a:gs>
-                </a:gsLst>
-                <a:lin ang="5400000"/>
-              </a:gradFill>
-              <a:effectLst>
-                <a:outerShdw blurRad="80000" dist="40000" dir="5040000" algn="tl">
-                  <a:srgbClr val="000000">
-                    <a:alpha val="30000"/>
-                  </a:srgbClr>
-                </a:outerShdw>
-              </a:effectLst>
-              <a:latin typeface="Chiller" pitchFamily="82" charset="0"/>
-            </a:endParaRPr>
-          </a:p>
-        </p:txBody>
-      </p:sp>
-      <p:sp>
-        <p:nvSpPr>
-          <p:cNvPr id="10" name="Rectangle 9"/>
-          <p:cNvSpPr/>
-          <p:nvPr/>
-        </p:nvSpPr>
-        <p:spPr>
-          <a:xfrm>
-            <a:off x="1977840" y="4353636"/>
-            <a:ext cx="4823756" cy="830997"/>
-          </a:xfrm>
-          <a:prstGeom prst="rect">
-            <a:avLst/>
-          </a:prstGeom>
-          <a:noFill/>
-        </p:spPr>
-        <p:txBody>
-          <a:bodyPr wrap="none" lIns="91440" tIns="45720" rIns="91440" bIns="45720">
-            <a:spAutoFit/>
-            <a:scene3d>
-              <a:camera prst="orthographicFront"/>
-              <a:lightRig rig="flat" dir="tl">
-                <a:rot lat="0" lon="0" rev="6600000"/>
-              </a:lightRig>
-            </a:scene3d>
-            <a:sp3d extrusionH="25400" contourW="8890">
-              <a:bevelT w="38100" h="31750"/>
-              <a:contourClr>
-                <a:schemeClr val="accent2">
-                  <a:shade val="75000"/>
-                </a:schemeClr>
-              </a:contourClr>
-            </a:sp3d>
-          </a:bodyPr>
-          <a:lstStyle/>
-          <a:p>
-            <a:pPr algn="ctr"/>
-            <a:r>
-              <a:rPr lang="en-US" sz="4800" b="1" dirty="0" smtClean="0">
+              </a:endParaRPr>
+            </a:p>
+          </p:txBody>
+        </p:sp>
+        <p:sp>
+          <p:nvSpPr>
+            <p:cNvPr id="10" name="Rectangle 9"/>
+            <p:cNvSpPr/>
+            <p:nvPr/>
+          </p:nvSpPr>
+          <p:spPr>
+            <a:xfrm>
+              <a:off x="1977840" y="4353636"/>
+              <a:ext cx="4823756" cy="830997"/>
+            </a:xfrm>
+            <a:prstGeom prst="rect">
+              <a:avLst/>
+            </a:prstGeom>
+            <a:noFill/>
+          </p:spPr>
+          <p:txBody>
+            <a:bodyPr wrap="none" lIns="91440" tIns="45720" rIns="91440" bIns="45720">
+              <a:spAutoFit/>
+              <a:scene3d>
+                <a:camera prst="orthographicFront"/>
+                <a:lightRig rig="flat" dir="tl">
+                  <a:rot lat="0" lon="0" rev="6600000"/>
+                </a:lightRig>
+              </a:scene3d>
+              <a:sp3d extrusionH="25400" contourW="8890">
+                <a:bevelT w="38100" h="31750"/>
+                <a:contourClr>
+                  <a:schemeClr val="accent2">
+                    <a:shade val="75000"/>
+                  </a:schemeClr>
+                </a:contourClr>
+              </a:sp3d>
+            </a:bodyPr>
+            <a:lstStyle/>
+            <a:p>
+              <a:pPr algn="ctr"/>
+              <a:r>
+                <a:rPr lang="en-US" sz="4800" b="1" dirty="0" smtClean="0">
+                  <a:ln w="11430"/>
+                  <a:gradFill>
+                    <a:gsLst>
+                      <a:gs pos="0">
+                        <a:schemeClr val="accent2">
+                          <a:tint val="70000"/>
+                          <a:satMod val="245000"/>
+                        </a:schemeClr>
+                      </a:gs>
+                      <a:gs pos="75000">
+                        <a:schemeClr val="accent2">
+                          <a:tint val="90000"/>
+                          <a:shade val="60000"/>
+                          <a:satMod val="240000"/>
+                        </a:schemeClr>
+                      </a:gs>
+                      <a:gs pos="100000">
+                        <a:schemeClr val="accent2">
+                          <a:tint val="100000"/>
+                          <a:shade val="50000"/>
+                          <a:satMod val="240000"/>
+                        </a:schemeClr>
+                      </a:gs>
+                    </a:gsLst>
+                    <a:lin ang="5400000"/>
+                  </a:gradFill>
+                  <a:effectLst>
+                    <a:outerShdw blurRad="50800" dist="39000" dir="5460000" algn="tl">
+                      <a:srgbClr val="000000">
+                        <a:alpha val="38000"/>
+                      </a:srgbClr>
+                    </a:outerShdw>
+                  </a:effectLst>
+                  <a:latin typeface="Chiller" pitchFamily="82" charset="0"/>
+                </a:rPr>
+                <a:t>…you’ll go BANANAS!</a:t>
+              </a:r>
+              <a:endParaRPr lang="en-US" sz="4800" b="1" dirty="0">
                 <a:ln w="11430"/>
                 <a:gradFill>
                   <a:gsLst>
@@ -6050,48 +6801,11 @@
                     </a:srgbClr>
                   </a:outerShdw>
                 </a:effectLst>
-                <a:latin typeface="Chiller" pitchFamily="82" charset="0"/>
-              </a:rPr>
-              <a:t>…you’ll go BANANAS!</a:t>
-            </a:r>
-            <a:endParaRPr lang="en-US" sz="4800" b="1" dirty="0">
-              <a:ln w="11430"/>
-              <a:gradFill>
-                <a:gsLst>
-                  <a:gs pos="0">
-                    <a:schemeClr val="accent2">
-                      <a:tint val="70000"/>
-                      <a:satMod val="245000"/>
-                    </a:schemeClr>
-                  </a:gs>
-                  <a:gs pos="75000">
-                    <a:schemeClr val="accent2">
-                      <a:tint val="90000"/>
-                      <a:shade val="60000"/>
-                      <a:satMod val="240000"/>
-                    </a:schemeClr>
-                  </a:gs>
-                  <a:gs pos="100000">
-                    <a:schemeClr val="accent2">
-                      <a:tint val="100000"/>
-                      <a:shade val="50000"/>
-                      <a:satMod val="240000"/>
-                    </a:schemeClr>
-                  </a:gs>
-                </a:gsLst>
-                <a:lin ang="5400000"/>
-              </a:gradFill>
-              <a:effectLst>
-                <a:outerShdw blurRad="50800" dist="39000" dir="5460000" algn="tl">
-                  <a:srgbClr val="000000">
-                    <a:alpha val="38000"/>
-                  </a:srgbClr>
-                </a:outerShdw>
-              </a:effectLst>
-            </a:endParaRPr>
-          </a:p>
-        </p:txBody>
-      </p:sp>
+              </a:endParaRPr>
+            </a:p>
+          </p:txBody>
+        </p:sp>
+      </p:grpSp>
       <p:grpSp>
         <p:nvGrpSpPr>
           <p:cNvPr id="11" name="Group 10"/>
@@ -8037,6 +8751,54 @@
           </p:cxnSp>
         </p:grpSp>
       </p:grpSp>
+      <p:sp>
+        <p:nvSpPr>
+          <p:cNvPr id="48" name="Slide Number Placeholder 47"/>
+          <p:cNvSpPr>
+            <a:spLocks noGrp="1"/>
+          </p:cNvSpPr>
+          <p:nvPr>
+            <p:ph type="sldNum" sz="quarter" idx="12"/>
+          </p:nvPr>
+        </p:nvSpPr>
+        <p:spPr/>
+        <p:txBody>
+          <a:bodyPr/>
+          <a:lstStyle/>
+          <a:p>
+            <a:fld id="{4A5A7388-53DE-DF4C-B882-890D8596A7FC}" type="slidenum">
+              <a:rPr lang="en-US" smtClean="0"/>
+              <a:pPr/>
+              <a:t>3</a:t>
+            </a:fld>
+            <a:endParaRPr lang="en-US"/>
+          </a:p>
+        </p:txBody>
+      </p:sp>
+      <p:pic>
+        <p:nvPicPr>
+          <p:cNvPr id="49" name="Picture 48" descr="jellytime.gif"/>
+          <p:cNvPicPr>
+            <a:picLocks noChangeAspect="1"/>
+          </p:cNvPicPr>
+          <p:nvPr/>
+        </p:nvPicPr>
+        <p:blipFill>
+          <a:blip r:embed="rId5"/>
+          <a:stretch>
+            <a:fillRect/>
+          </a:stretch>
+        </p:blipFill>
+        <p:spPr>
+          <a:xfrm>
+            <a:off x="-327867" y="4600575"/>
+            <a:ext cx="2371725" cy="2343150"/>
+          </a:xfrm>
+          <a:prstGeom prst="rect">
+            <a:avLst/>
+          </a:prstGeom>
+        </p:spPr>
+      </p:pic>
     </p:spTree>
   </p:cSld>
   <p:clrMapOvr>
@@ -8087,6 +8849,447 @@
                                       </p:cBhvr>
                                       <p:to>
                                         <p:strVal val="visible"/>
+                                      </p:to>
+                                    </p:set>
+                                  </p:childTnLst>
+                                </p:cTn>
+                              </p:par>
+                            </p:childTnLst>
+                          </p:cTn>
+                        </p:par>
+                      </p:childTnLst>
+                    </p:cTn>
+                  </p:par>
+                  <p:par>
+                    <p:cTn id="7" fill="hold">
+                      <p:stCondLst>
+                        <p:cond delay="indefinite"/>
+                      </p:stCondLst>
+                      <p:childTnLst>
+                        <p:par>
+                          <p:cTn id="8" fill="hold">
+                            <p:stCondLst>
+                              <p:cond delay="0"/>
+                            </p:stCondLst>
+                            <p:childTnLst>
+                              <p:par>
+                                <p:cTn id="9" presetID="49" presetClass="entr" presetSubtype="0" decel="100000" fill="hold" nodeType="clickEffect">
+                                  <p:stCondLst>
+                                    <p:cond delay="0"/>
+                                  </p:stCondLst>
+                                  <p:childTnLst>
+                                    <p:set>
+                                      <p:cBhvr>
+                                        <p:cTn id="10" dur="1" fill="hold">
+                                          <p:stCondLst>
+                                            <p:cond delay="0"/>
+                                          </p:stCondLst>
+                                        </p:cTn>
+                                        <p:tgtEl>
+                                          <p:spTgt spid="47"/>
+                                        </p:tgtEl>
+                                        <p:attrNameLst>
+                                          <p:attrName>style.visibility</p:attrName>
+                                        </p:attrNameLst>
+                                      </p:cBhvr>
+                                      <p:to>
+                                        <p:strVal val="visible"/>
+                                      </p:to>
+                                    </p:set>
+                                    <p:anim calcmode="lin" valueType="num">
+                                      <p:cBhvr>
+                                        <p:cTn id="11" dur="500" fill="hold"/>
+                                        <p:tgtEl>
+                                          <p:spTgt spid="47"/>
+                                        </p:tgtEl>
+                                        <p:attrNameLst>
+                                          <p:attrName>ppt_w</p:attrName>
+                                        </p:attrNameLst>
+                                      </p:cBhvr>
+                                      <p:tavLst>
+                                        <p:tav tm="0">
+                                          <p:val>
+                                            <p:fltVal val="0"/>
+                                          </p:val>
+                                        </p:tav>
+                                        <p:tav tm="100000">
+                                          <p:val>
+                                            <p:strVal val="#ppt_w"/>
+                                          </p:val>
+                                        </p:tav>
+                                      </p:tavLst>
+                                    </p:anim>
+                                    <p:anim calcmode="lin" valueType="num">
+                                      <p:cBhvr>
+                                        <p:cTn id="12" dur="500" fill="hold"/>
+                                        <p:tgtEl>
+                                          <p:spTgt spid="47"/>
+                                        </p:tgtEl>
+                                        <p:attrNameLst>
+                                          <p:attrName>ppt_h</p:attrName>
+                                        </p:attrNameLst>
+                                      </p:cBhvr>
+                                      <p:tavLst>
+                                        <p:tav tm="0">
+                                          <p:val>
+                                            <p:fltVal val="0"/>
+                                          </p:val>
+                                        </p:tav>
+                                        <p:tav tm="100000">
+                                          <p:val>
+                                            <p:strVal val="#ppt_h"/>
+                                          </p:val>
+                                        </p:tav>
+                                      </p:tavLst>
+                                    </p:anim>
+                                    <p:anim calcmode="lin" valueType="num">
+                                      <p:cBhvr>
+                                        <p:cTn id="13" dur="500" fill="hold"/>
+                                        <p:tgtEl>
+                                          <p:spTgt spid="47"/>
+                                        </p:tgtEl>
+                                        <p:attrNameLst>
+                                          <p:attrName>style.rotation</p:attrName>
+                                        </p:attrNameLst>
+                                      </p:cBhvr>
+                                      <p:tavLst>
+                                        <p:tav tm="0">
+                                          <p:val>
+                                            <p:fltVal val="360"/>
+                                          </p:val>
+                                        </p:tav>
+                                        <p:tav tm="100000">
+                                          <p:val>
+                                            <p:fltVal val="0"/>
+                                          </p:val>
+                                        </p:tav>
+                                      </p:tavLst>
+                                    </p:anim>
+                                    <p:animEffect transition="in" filter="fade">
+                                      <p:cBhvr>
+                                        <p:cTn id="14" dur="500"/>
+                                        <p:tgtEl>
+                                          <p:spTgt spid="47"/>
+                                        </p:tgtEl>
+                                      </p:cBhvr>
+                                    </p:animEffect>
+                                  </p:childTnLst>
+                                </p:cTn>
+                              </p:par>
+                            </p:childTnLst>
+                          </p:cTn>
+                        </p:par>
+                        <p:par>
+                          <p:cTn id="15" fill="hold">
+                            <p:stCondLst>
+                              <p:cond delay="500"/>
+                            </p:stCondLst>
+                            <p:childTnLst>
+                              <p:par>
+                                <p:cTn id="16" presetID="2" presetClass="entr" presetSubtype="4" fill="hold" nodeType="afterEffect">
+                                  <p:stCondLst>
+                                    <p:cond delay="0"/>
+                                  </p:stCondLst>
+                                  <p:childTnLst>
+                                    <p:set>
+                                      <p:cBhvr>
+                                        <p:cTn id="17" dur="1" fill="hold">
+                                          <p:stCondLst>
+                                            <p:cond delay="0"/>
+                                          </p:stCondLst>
+                                        </p:cTn>
+                                        <p:tgtEl>
+                                          <p:spTgt spid="11"/>
+                                        </p:tgtEl>
+                                        <p:attrNameLst>
+                                          <p:attrName>style.visibility</p:attrName>
+                                        </p:attrNameLst>
+                                      </p:cBhvr>
+                                      <p:to>
+                                        <p:strVal val="visible"/>
+                                      </p:to>
+                                    </p:set>
+                                    <p:anim calcmode="lin" valueType="num">
+                                      <p:cBhvr additive="base">
+                                        <p:cTn id="18" dur="500" fill="hold"/>
+                                        <p:tgtEl>
+                                          <p:spTgt spid="11"/>
+                                        </p:tgtEl>
+                                        <p:attrNameLst>
+                                          <p:attrName>ppt_x</p:attrName>
+                                        </p:attrNameLst>
+                                      </p:cBhvr>
+                                      <p:tavLst>
+                                        <p:tav tm="0">
+                                          <p:val>
+                                            <p:strVal val="#ppt_x"/>
+                                          </p:val>
+                                        </p:tav>
+                                        <p:tav tm="100000">
+                                          <p:val>
+                                            <p:strVal val="#ppt_x"/>
+                                          </p:val>
+                                        </p:tav>
+                                      </p:tavLst>
+                                    </p:anim>
+                                    <p:anim calcmode="lin" valueType="num">
+                                      <p:cBhvr additive="base">
+                                        <p:cTn id="19" dur="500" fill="hold"/>
+                                        <p:tgtEl>
+                                          <p:spTgt spid="11"/>
+                                        </p:tgtEl>
+                                        <p:attrNameLst>
+                                          <p:attrName>ppt_y</p:attrName>
+                                        </p:attrNameLst>
+                                      </p:cBhvr>
+                                      <p:tavLst>
+                                        <p:tav tm="0">
+                                          <p:val>
+                                            <p:strVal val="1+#ppt_h/2"/>
+                                          </p:val>
+                                        </p:tav>
+                                        <p:tav tm="100000">
+                                          <p:val>
+                                            <p:strVal val="#ppt_y"/>
+                                          </p:val>
+                                        </p:tav>
+                                      </p:tavLst>
+                                    </p:anim>
+                                  </p:childTnLst>
+                                </p:cTn>
+                              </p:par>
+                              <p:par>
+                                <p:cTn id="20" presetID="2" presetClass="entr" presetSubtype="4" fill="hold" nodeType="withEffect">
+                                  <p:stCondLst>
+                                    <p:cond delay="500"/>
+                                  </p:stCondLst>
+                                  <p:childTnLst>
+                                    <p:set>
+                                      <p:cBhvr>
+                                        <p:cTn id="21" dur="1" fill="hold">
+                                          <p:stCondLst>
+                                            <p:cond delay="0"/>
+                                          </p:stCondLst>
+                                        </p:cTn>
+                                        <p:tgtEl>
+                                          <p:spTgt spid="49"/>
+                                        </p:tgtEl>
+                                        <p:attrNameLst>
+                                          <p:attrName>style.visibility</p:attrName>
+                                        </p:attrNameLst>
+                                      </p:cBhvr>
+                                      <p:to>
+                                        <p:strVal val="visible"/>
+                                      </p:to>
+                                    </p:set>
+                                    <p:anim calcmode="lin" valueType="num">
+                                      <p:cBhvr additive="base">
+                                        <p:cTn id="22" dur="500" fill="hold"/>
+                                        <p:tgtEl>
+                                          <p:spTgt spid="49"/>
+                                        </p:tgtEl>
+                                        <p:attrNameLst>
+                                          <p:attrName>ppt_x</p:attrName>
+                                        </p:attrNameLst>
+                                      </p:cBhvr>
+                                      <p:tavLst>
+                                        <p:tav tm="0">
+                                          <p:val>
+                                            <p:strVal val="#ppt_x"/>
+                                          </p:val>
+                                        </p:tav>
+                                        <p:tav tm="100000">
+                                          <p:val>
+                                            <p:strVal val="#ppt_x"/>
+                                          </p:val>
+                                        </p:tav>
+                                      </p:tavLst>
+                                    </p:anim>
+                                    <p:anim calcmode="lin" valueType="num">
+                                      <p:cBhvr additive="base">
+                                        <p:cTn id="23" dur="500" fill="hold"/>
+                                        <p:tgtEl>
+                                          <p:spTgt spid="49"/>
+                                        </p:tgtEl>
+                                        <p:attrNameLst>
+                                          <p:attrName>ppt_y</p:attrName>
+                                        </p:attrNameLst>
+                                      </p:cBhvr>
+                                      <p:tavLst>
+                                        <p:tav tm="0">
+                                          <p:val>
+                                            <p:strVal val="1+#ppt_h/2"/>
+                                          </p:val>
+                                        </p:tav>
+                                        <p:tav tm="100000">
+                                          <p:val>
+                                            <p:strVal val="#ppt_y"/>
+                                          </p:val>
+                                        </p:tav>
+                                      </p:tavLst>
+                                    </p:anim>
+                                  </p:childTnLst>
+                                </p:cTn>
+                              </p:par>
+                            </p:childTnLst>
+                          </p:cTn>
+                        </p:par>
+                      </p:childTnLst>
+                    </p:cTn>
+                  </p:par>
+                  <p:par>
+                    <p:cTn id="24" fill="hold">
+                      <p:stCondLst>
+                        <p:cond delay="indefinite"/>
+                      </p:stCondLst>
+                      <p:childTnLst>
+                        <p:par>
+                          <p:cTn id="25" fill="hold">
+                            <p:stCondLst>
+                              <p:cond delay="0"/>
+                            </p:stCondLst>
+                            <p:childTnLst>
+                              <p:par>
+                                <p:cTn id="26" presetID="2" presetClass="exit" presetSubtype="4" fill="hold" nodeType="clickEffect">
+                                  <p:stCondLst>
+                                    <p:cond delay="0"/>
+                                  </p:stCondLst>
+                                  <p:childTnLst>
+                                    <p:anim calcmode="lin" valueType="num">
+                                      <p:cBhvr additive="base">
+                                        <p:cTn id="27" dur="500"/>
+                                        <p:tgtEl>
+                                          <p:spTgt spid="11"/>
+                                        </p:tgtEl>
+                                        <p:attrNameLst>
+                                          <p:attrName>ppt_x</p:attrName>
+                                        </p:attrNameLst>
+                                      </p:cBhvr>
+                                      <p:tavLst>
+                                        <p:tav tm="0">
+                                          <p:val>
+                                            <p:strVal val="ppt_x"/>
+                                          </p:val>
+                                        </p:tav>
+                                        <p:tav tm="100000">
+                                          <p:val>
+                                            <p:strVal val="ppt_x"/>
+                                          </p:val>
+                                        </p:tav>
+                                      </p:tavLst>
+                                    </p:anim>
+                                    <p:anim calcmode="lin" valueType="num">
+                                      <p:cBhvr additive="base">
+                                        <p:cTn id="28" dur="500"/>
+                                        <p:tgtEl>
+                                          <p:spTgt spid="11"/>
+                                        </p:tgtEl>
+                                        <p:attrNameLst>
+                                          <p:attrName>ppt_y</p:attrName>
+                                        </p:attrNameLst>
+                                      </p:cBhvr>
+                                      <p:tavLst>
+                                        <p:tav tm="0">
+                                          <p:val>
+                                            <p:strVal val="ppt_y"/>
+                                          </p:val>
+                                        </p:tav>
+                                        <p:tav tm="100000">
+                                          <p:val>
+                                            <p:strVal val="1+ppt_h/2"/>
+                                          </p:val>
+                                        </p:tav>
+                                      </p:tavLst>
+                                    </p:anim>
+                                    <p:set>
+                                      <p:cBhvr>
+                                        <p:cTn id="29" dur="1" fill="hold">
+                                          <p:stCondLst>
+                                            <p:cond delay="499"/>
+                                          </p:stCondLst>
+                                        </p:cTn>
+                                        <p:tgtEl>
+                                          <p:spTgt spid="11"/>
+                                        </p:tgtEl>
+                                        <p:attrNameLst>
+                                          <p:attrName>style.visibility</p:attrName>
+                                        </p:attrNameLst>
+                                      </p:cBhvr>
+                                      <p:to>
+                                        <p:strVal val="hidden"/>
+                                      </p:to>
+                                    </p:set>
+                                  </p:childTnLst>
+                                </p:cTn>
+                              </p:par>
+                              <p:par>
+                                <p:cTn id="30" presetID="2" presetClass="exit" presetSubtype="8" fill="hold" nodeType="withEffect">
+                                  <p:stCondLst>
+                                    <p:cond delay="500"/>
+                                  </p:stCondLst>
+                                  <p:childTnLst>
+                                    <p:anim calcmode="lin" valueType="num">
+                                      <p:cBhvr additive="base">
+                                        <p:cTn id="31" dur="3000"/>
+                                        <p:tgtEl>
+                                          <p:spTgt spid="49"/>
+                                        </p:tgtEl>
+                                        <p:attrNameLst>
+                                          <p:attrName>ppt_x</p:attrName>
+                                        </p:attrNameLst>
+                                      </p:cBhvr>
+                                      <p:tavLst>
+                                        <p:tav tm="0">
+                                          <p:val>
+                                            <p:strVal val="ppt_x"/>
+                                          </p:val>
+                                        </p:tav>
+                                        <p:tav tm="100000">
+                                          <p:val>
+                                            <p:strVal val="0-ppt_w/2"/>
+                                          </p:val>
+                                        </p:tav>
+                                      </p:tavLst>
+                                    </p:anim>
+                                    <p:anim calcmode="lin" valueType="num">
+                                      <p:cBhvr additive="base">
+                                        <p:cTn id="32" dur="3000"/>
+                                        <p:tgtEl>
+                                          <p:spTgt spid="49"/>
+                                        </p:tgtEl>
+                                        <p:attrNameLst>
+                                          <p:attrName>ppt_y</p:attrName>
+                                        </p:attrNameLst>
+                                      </p:cBhvr>
+                                      <p:tavLst>
+                                        <p:tav tm="0">
+                                          <p:val>
+                                            <p:strVal val="ppt_y"/>
+                                          </p:val>
+                                        </p:tav>
+                                        <p:tav tm="100000">
+                                          <p:val>
+                                            <p:strVal val="ppt_y"/>
+                                          </p:val>
+                                        </p:tav>
+                                      </p:tavLst>
+                                    </p:anim>
+                                    <p:set>
+                                      <p:cBhvr>
+                                        <p:cTn id="33" dur="1" fill="hold">
+                                          <p:stCondLst>
+                                            <p:cond delay="2999"/>
+                                          </p:stCondLst>
+                                        </p:cTn>
+                                        <p:tgtEl>
+                                          <p:spTgt spid="49"/>
+                                        </p:tgtEl>
+                                        <p:attrNameLst>
+                                          <p:attrName>style.visibility</p:attrName>
+                                        </p:attrNameLst>
+                                      </p:cBhvr>
+                                      <p:to>
+                                        <p:strVal val="hidden"/>
                                       </p:to>
                                     </p:set>
                                   </p:childTnLst>
@@ -8172,7 +9375,7 @@
                 <a:latin typeface="Arial" pitchFamily="34" charset="0"/>
                 <a:cs typeface="Arial" pitchFamily="34" charset="0"/>
               </a:rPr>
-              <a:t>Overview</a:t>
+              <a:t>What is Quiz Monkey?</a:t>
             </a:r>
             <a:endParaRPr lang="en-US" dirty="0">
               <a:effectLst>
@@ -8220,8 +9423,8 @@
         </p:nvSpPr>
         <p:spPr>
           <a:xfrm>
-            <a:off x="1685925" y="2564963"/>
-            <a:ext cx="5638800" cy="954107"/>
+            <a:off x="1317428" y="2194560"/>
+            <a:ext cx="6778821" cy="1384995"/>
           </a:xfrm>
           <a:prstGeom prst="rect">
             <a:avLst/>
@@ -8235,17 +9438,24 @@
           <a:lstStyle/>
           <a:p>
             <a:r>
-              <a:rPr lang="en-US" sz="2000" dirty="0" smtClean="0">
+              <a:rPr lang="en-US" sz="2800" dirty="0" smtClean="0">
                 <a:solidFill>
                   <a:schemeClr val="bg1"/>
                 </a:solidFill>
                 <a:latin typeface="Comic Sans MS" pitchFamily="66" charset="0"/>
               </a:rPr>
-              <a:t>Quiz Monkey is:</a:t>
-            </a:r>
-          </a:p>
-          <a:p>
-            <a:endParaRPr lang="en-US" dirty="0" smtClean="0">
+              <a:t>Quiz Monkey is</a:t>
+            </a:r>
+            <a:r>
+              <a:rPr lang="en-US" sz="2800" dirty="0" smtClean="0">
+                <a:solidFill>
+                  <a:schemeClr val="bg1"/>
+                </a:solidFill>
+                <a:latin typeface="Comic Sans MS" pitchFamily="66" charset="0"/>
+              </a:rPr>
+              <a:t>:</a:t>
+            </a:r>
+            <a:endParaRPr lang="en-US" sz="2800" dirty="0" smtClean="0">
               <a:solidFill>
                 <a:schemeClr val="bg1"/>
               </a:solidFill>
@@ -8254,31 +9464,60 @@
           </a:p>
           <a:p>
             <a:r>
-              <a:rPr lang="en-US" dirty="0" smtClean="0">
+              <a:rPr lang="en-US" sz="2800" dirty="0" smtClean="0">
                 <a:solidFill>
                   <a:schemeClr val="bg1"/>
                 </a:solidFill>
                 <a:latin typeface="Comic Sans MS" pitchFamily="66" charset="0"/>
               </a:rPr>
-              <a:t>   -an educational </a:t>
-            </a:r>
-            <a:r>
-              <a:rPr lang="en-US" dirty="0" err="1" smtClean="0">
+              <a:t>- an </a:t>
+            </a:r>
+            <a:r>
+              <a:rPr lang="en-US" sz="2800" dirty="0" smtClean="0">
                 <a:solidFill>
                   <a:schemeClr val="bg1"/>
                 </a:solidFill>
                 <a:latin typeface="Comic Sans MS" pitchFamily="66" charset="0"/>
               </a:rPr>
-              <a:t>iPhone</a:t>
-            </a:r>
-            <a:r>
-              <a:rPr lang="en-US" dirty="0" smtClean="0">
+              <a:t>educational iPhone game for kids </a:t>
+            </a:r>
+            <a:r>
+              <a:rPr lang="en-US" sz="2800" dirty="0" smtClean="0">
                 <a:solidFill>
                   <a:schemeClr val="bg1"/>
                 </a:solidFill>
                 <a:latin typeface="Comic Sans MS" pitchFamily="66" charset="0"/>
               </a:rPr>
-              <a:t> game for kids aged 7-8</a:t>
+              <a:t>                           </a:t>
+            </a:r>
+            <a:r>
+              <a:rPr lang="en-US" sz="2800" dirty="0" smtClean="0">
+                <a:solidFill>
+                  <a:schemeClr val="accent3">
+                    <a:lumMod val="50000"/>
+                  </a:schemeClr>
+                </a:solidFill>
+                <a:latin typeface="Comic Sans MS" pitchFamily="66" charset="0"/>
+              </a:rPr>
+              <a:t>_</a:t>
+            </a:r>
+            <a:r>
+              <a:rPr lang="en-US" sz="2800" dirty="0" smtClean="0">
+                <a:solidFill>
+                  <a:schemeClr val="bg1"/>
+                </a:solidFill>
+                <a:latin typeface="Comic Sans MS" pitchFamily="66" charset="0"/>
+              </a:rPr>
+              <a:t>aged </a:t>
+            </a:r>
+            <a:r>
+              <a:rPr lang="en-US" sz="2800" dirty="0" smtClean="0">
+                <a:solidFill>
+                  <a:schemeClr val="bg1"/>
+                </a:solidFill>
+                <a:latin typeface="Comic Sans MS" pitchFamily="66" charset="0"/>
+              </a:rPr>
+              <a:t>7-8</a:t>
             </a:r>
           </a:p>
         </p:txBody>
@@ -8291,8 +9530,8 @@
         </p:nvSpPr>
         <p:spPr>
           <a:xfrm>
-            <a:off x="1685925" y="3488293"/>
-            <a:ext cx="6496050" cy="369332"/>
+            <a:off x="1318114" y="3507750"/>
+            <a:ext cx="8149442" cy="1384995"/>
           </a:xfrm>
           <a:prstGeom prst="rect">
             <a:avLst/>
@@ -8306,15 +9545,47 @@
           <a:lstStyle/>
           <a:p>
             <a:r>
-              <a:rPr lang="en-US" dirty="0" smtClean="0">
+              <a:rPr lang="en-US" sz="2800" dirty="0" smtClean="0">
                 <a:solidFill>
                   <a:schemeClr val="bg1"/>
                 </a:solidFill>
                 <a:latin typeface="Comic Sans MS" pitchFamily="66" charset="0"/>
               </a:rPr>
-              <a:t>   -a quiz game of vocabulary and grammar</a:t>
-            </a:r>
-            <a:endParaRPr lang="en-US" dirty="0">
+              <a:t>- A game that tests </a:t>
+            </a:r>
+            <a:r>
+              <a:rPr lang="en-US" sz="2800" dirty="0" smtClean="0">
+                <a:solidFill>
+                  <a:schemeClr val="bg1"/>
+                </a:solidFill>
+                <a:latin typeface="Comic Sans MS" pitchFamily="66" charset="0"/>
+              </a:rPr>
+              <a:t>vocabulary </a:t>
+            </a:r>
+            <a:br>
+              <a:rPr lang="en-US" sz="2800" dirty="0" smtClean="0">
+                <a:solidFill>
+                  <a:schemeClr val="bg1"/>
+                </a:solidFill>
+                <a:latin typeface="Comic Sans MS" pitchFamily="66" charset="0"/>
+              </a:rPr>
+            </a:br>
+            <a:r>
+              <a:rPr lang="en-US" sz="2800" dirty="0" smtClean="0">
+                <a:solidFill>
+                  <a:schemeClr val="bg1"/>
+                </a:solidFill>
+                <a:latin typeface="Comic Sans MS" pitchFamily="66" charset="0"/>
+              </a:rPr>
+              <a:t>  and grammar</a:t>
+            </a:r>
+          </a:p>
+          <a:p>
+            <a:pPr>
+              <a:buFontTx/>
+              <a:buChar char="-"/>
+            </a:pPr>
+            <a:endParaRPr lang="en-US" sz="2800" dirty="0">
               <a:solidFill>
                 <a:schemeClr val="bg1"/>
               </a:solidFill>
@@ -8331,8 +9602,8 @@
         </p:nvSpPr>
         <p:spPr>
           <a:xfrm>
-            <a:off x="1685925" y="3857625"/>
-            <a:ext cx="6025060" cy="369332"/>
+            <a:off x="1317428" y="4444495"/>
+            <a:ext cx="6025060" cy="523220"/>
           </a:xfrm>
           <a:prstGeom prst="rect">
             <a:avLst/>
@@ -8346,15 +9617,15 @@
           <a:lstStyle/>
           <a:p>
             <a:r>
-              <a:rPr lang="en-US" dirty="0" smtClean="0">
+              <a:rPr lang="en-US" sz="2800" dirty="0" smtClean="0">
                 <a:solidFill>
                   <a:schemeClr val="bg1"/>
                 </a:solidFill>
                 <a:latin typeface="Comic Sans MS" pitchFamily="66" charset="0"/>
               </a:rPr>
-              <a:t>   -a way for teachers to track students performance</a:t>
-            </a:r>
-            <a:endParaRPr lang="en-US" dirty="0">
+              <a:t>- A fun way for kids to learn</a:t>
+            </a:r>
+            <a:endParaRPr lang="en-US" sz="2800" dirty="0">
               <a:solidFill>
                 <a:schemeClr val="bg1"/>
               </a:solidFill>
@@ -8371,8 +9642,8 @@
         </p:nvSpPr>
         <p:spPr>
           <a:xfrm>
-            <a:off x="1685925" y="4226957"/>
-            <a:ext cx="4490332" cy="369332"/>
+            <a:off x="1021426" y="4967715"/>
+            <a:ext cx="6886822" cy="523220"/>
           </a:xfrm>
           <a:prstGeom prst="rect">
             <a:avLst/>
@@ -8385,7 +9656,7 @@
           <a:lstStyle/>
           <a:p>
             <a:r>
-              <a:rPr lang="en-US" dirty="0" smtClean="0">
+              <a:rPr lang="en-US" sz="2800" dirty="0" smtClean="0">
                 <a:solidFill>
                   <a:schemeClr val="bg1"/>
                 </a:solidFill>
@@ -8393,7 +9664,31 @@
               </a:rPr>
               <a:t>   -for more info, check out our website!</a:t>
             </a:r>
-            <a:endParaRPr lang="en-US" dirty="0"/>
+            <a:endParaRPr lang="en-US" sz="2800" dirty="0"/>
+          </a:p>
+        </p:txBody>
+      </p:sp>
+      <p:sp>
+        <p:nvSpPr>
+          <p:cNvPr id="45" name="Slide Number Placeholder 44"/>
+          <p:cNvSpPr>
+            <a:spLocks noGrp="1"/>
+          </p:cNvSpPr>
+          <p:nvPr>
+            <p:ph type="sldNum" sz="quarter" idx="12"/>
+          </p:nvPr>
+        </p:nvSpPr>
+        <p:spPr/>
+        <p:txBody>
+          <a:bodyPr/>
+          <a:lstStyle/>
+          <a:p>
+            <a:fld id="{4A5A7388-53DE-DF4C-B882-890D8596A7FC}" type="slidenum">
+              <a:rPr lang="en-US" smtClean="0"/>
+              <a:pPr/>
+              <a:t>4</a:t>
+            </a:fld>
+            <a:endParaRPr lang="en-US"/>
           </a:p>
         </p:txBody>
       </p:sp>
@@ -9180,6 +10475,30 @@
           </a:p>
         </p:txBody>
       </p:sp>
+      <p:sp>
+        <p:nvSpPr>
+          <p:cNvPr id="8" name="Slide Number Placeholder 7"/>
+          <p:cNvSpPr>
+            <a:spLocks noGrp="1"/>
+          </p:cNvSpPr>
+          <p:nvPr>
+            <p:ph type="sldNum" sz="quarter" idx="12"/>
+          </p:nvPr>
+        </p:nvSpPr>
+        <p:spPr/>
+        <p:txBody>
+          <a:bodyPr/>
+          <a:lstStyle/>
+          <a:p>
+            <a:fld id="{4A5A7388-53DE-DF4C-B882-890D8596A7FC}" type="slidenum">
+              <a:rPr lang="en-US" smtClean="0"/>
+              <a:pPr/>
+              <a:t>5</a:t>
+            </a:fld>
+            <a:endParaRPr lang="en-US"/>
+          </a:p>
+        </p:txBody>
+      </p:sp>
     </p:spTree>
   </p:cSld>
   <p:clrMapOvr>
@@ -10010,6 +11329,30 @@
           </a:p>
         </p:txBody>
       </p:sp>
+      <p:sp>
+        <p:nvSpPr>
+          <p:cNvPr id="11" name="Slide Number Placeholder 10"/>
+          <p:cNvSpPr>
+            <a:spLocks noGrp="1"/>
+          </p:cNvSpPr>
+          <p:nvPr>
+            <p:ph type="sldNum" sz="quarter" idx="12"/>
+          </p:nvPr>
+        </p:nvSpPr>
+        <p:spPr/>
+        <p:txBody>
+          <a:bodyPr/>
+          <a:lstStyle/>
+          <a:p>
+            <a:fld id="{4A5A7388-53DE-DF4C-B882-890D8596A7FC}" type="slidenum">
+              <a:rPr lang="en-US" smtClean="0"/>
+              <a:pPr/>
+              <a:t>6</a:t>
+            </a:fld>
+            <a:endParaRPr lang="en-US"/>
+          </a:p>
+        </p:txBody>
+      </p:sp>
     </p:spTree>
   </p:cSld>
   <p:clrMapOvr>
@@ -10555,23 +11898,33 @@
                 <a:latin typeface="Century Gothic"/>
                 <a:cs typeface="Century Gothic"/>
               </a:rPr>
-              <a:t>   -a way to enter your info for the </a:t>
-            </a:r>
-            <a:r>
-              <a:rPr lang="en-US" sz="2000" dirty="0" err="1" smtClean="0">
-                <a:latin typeface="Century Gothic"/>
-                <a:cs typeface="Century Gothic"/>
-              </a:rPr>
-              <a:t>leaderboard</a:t>
-            </a:r>
-            <a:r>
-              <a:rPr lang="en-US" sz="2000" dirty="0" smtClean="0">
-                <a:latin typeface="Century Gothic"/>
-                <a:cs typeface="Century Gothic"/>
-              </a:rPr>
-              <a:t>(V. 2)</a:t>
+              <a:t>   -a way to enter your info for the leaderboard(V. 2)</a:t>
             </a:r>
             <a:endParaRPr lang="en-US" sz="2000" dirty="0"/>
+          </a:p>
+        </p:txBody>
+      </p:sp>
+      <p:sp>
+        <p:nvSpPr>
+          <p:cNvPr id="7" name="Slide Number Placeholder 6"/>
+          <p:cNvSpPr>
+            <a:spLocks noGrp="1"/>
+          </p:cNvSpPr>
+          <p:nvPr>
+            <p:ph type="sldNum" sz="quarter" idx="12"/>
+          </p:nvPr>
+        </p:nvSpPr>
+        <p:spPr/>
+        <p:txBody>
+          <a:bodyPr/>
+          <a:lstStyle/>
+          <a:p>
+            <a:fld id="{4A5A7388-53DE-DF4C-B882-890D8596A7FC}" type="slidenum">
+              <a:rPr lang="en-US" smtClean="0"/>
+              <a:pPr/>
+              <a:t>7</a:t>
+            </a:fld>
+            <a:endParaRPr lang="en-US"/>
           </a:p>
         </p:txBody>
       </p:sp>
@@ -10826,7 +12179,7 @@
                 <a:latin typeface="Arial" pitchFamily="34" charset="0"/>
                 <a:cs typeface="Arial" pitchFamily="34" charset="0"/>
               </a:rPr>
-              <a:t>Testing</a:t>
+              <a:t>Unit Testing</a:t>
             </a:r>
             <a:endParaRPr lang="en-US" dirty="0">
               <a:effectLst>
@@ -10868,23 +12221,19 @@
               <a:rPr lang="en-CA" sz="2400" dirty="0" smtClean="0">
                 <a:latin typeface="Century Gothic" pitchFamily="34" charset="0"/>
               </a:rPr>
-              <a:t>Note:</a:t>
-            </a:r>
-          </a:p>
-          <a:p>
+              <a:t>A series of unit tests using the </a:t>
+            </a:r>
+            <a:r>
+              <a:rPr lang="en-CA" sz="2400" dirty="0" err="1" smtClean="0">
+                <a:latin typeface="Century Gothic" pitchFamily="34" charset="0"/>
+              </a:rPr>
+              <a:t>OCUnit</a:t>
+            </a:r>
             <a:r>
               <a:rPr lang="en-CA" sz="2400" dirty="0" smtClean="0">
                 <a:latin typeface="Century Gothic" pitchFamily="34" charset="0"/>
               </a:rPr>
-              <a:t>    We used an iterative process, so testing was</a:t>
-            </a:r>
-          </a:p>
-          <a:p>
-            <a:r>
-              <a:rPr lang="en-CA" sz="2400" dirty="0" smtClean="0">
-                <a:latin typeface="Century Gothic" pitchFamily="34" charset="0"/>
-              </a:rPr>
-              <a:t>      more or less ongoing.</a:t>
+              <a:t> framework were implemented to test the parsing of xml questions.</a:t>
             </a:r>
             <a:endParaRPr lang="en-CA" sz="2400" dirty="0">
               <a:latin typeface="Century Gothic" pitchFamily="34" charset="0"/>
@@ -10901,7 +12250,7 @@
         <p:spPr>
           <a:xfrm>
             <a:off x="1119116" y="3162687"/>
-            <a:ext cx="7301553" cy="400110"/>
+            <a:ext cx="7301553" cy="3170099"/>
           </a:xfrm>
           <a:prstGeom prst="rect">
             <a:avLst/>
@@ -10918,76 +12267,109 @@
               <a:rPr lang="en-CA" sz="2000" dirty="0" smtClean="0">
                 <a:latin typeface="Century Gothic" pitchFamily="34" charset="0"/>
               </a:rPr>
-              <a:t>In addition:</a:t>
-            </a:r>
+              <a:t>These test cases include:</a:t>
+            </a:r>
+            <a:br>
+              <a:rPr lang="en-CA" sz="2000" dirty="0" smtClean="0">
+                <a:latin typeface="Century Gothic" pitchFamily="34" charset="0"/>
+              </a:rPr>
+            </a:br>
+            <a:endParaRPr lang="en-CA" sz="2000" dirty="0" smtClean="0">
+              <a:latin typeface="Century Gothic" pitchFamily="34" charset="0"/>
+            </a:endParaRPr>
+          </a:p>
+          <a:p>
+            <a:pPr>
+              <a:buFontTx/>
+              <a:buChar char="-"/>
+            </a:pPr>
+            <a:r>
+              <a:rPr lang="en-CA" sz="2000" dirty="0" smtClean="0">
+                <a:latin typeface="Century Gothic" pitchFamily="34" charset="0"/>
+              </a:rPr>
+              <a:t> Ensuring correctly formatted questions will be loaded</a:t>
+            </a:r>
+            <a:br>
+              <a:rPr lang="en-CA" sz="2000" dirty="0" smtClean="0">
+                <a:latin typeface="Century Gothic" pitchFamily="34" charset="0"/>
+              </a:rPr>
+            </a:br>
+            <a:endParaRPr lang="en-CA" sz="2000" dirty="0" smtClean="0">
+              <a:latin typeface="Century Gothic" pitchFamily="34" charset="0"/>
+            </a:endParaRPr>
+          </a:p>
+          <a:p>
+            <a:pPr>
+              <a:buFontTx/>
+              <a:buChar char="-"/>
+            </a:pPr>
+            <a:r>
+              <a:rPr lang="en-CA" sz="2000" dirty="0" smtClean="0">
+                <a:latin typeface="Century Gothic" pitchFamily="34" charset="0"/>
+              </a:rPr>
+              <a:t> </a:t>
+            </a:r>
+            <a:r>
+              <a:rPr lang="en-CA" sz="2000" dirty="0" smtClean="0">
+                <a:latin typeface="Century Gothic" pitchFamily="34" charset="0"/>
+              </a:rPr>
+              <a:t>Ensuring that invalid questions from xml will not be loaded and filtered from the program</a:t>
+            </a:r>
+            <a:br>
+              <a:rPr lang="en-CA" sz="2000" dirty="0" smtClean="0">
+                <a:latin typeface="Century Gothic" pitchFamily="34" charset="0"/>
+              </a:rPr>
+            </a:br>
+            <a:r>
+              <a:rPr lang="en-CA" sz="2000" dirty="0" smtClean="0">
+                <a:latin typeface="Century Gothic" pitchFamily="34" charset="0"/>
+              </a:rPr>
+              <a:t/>
+            </a:r>
+            <a:br>
+              <a:rPr lang="en-CA" sz="2000" dirty="0" smtClean="0">
+                <a:latin typeface="Century Gothic" pitchFamily="34" charset="0"/>
+              </a:rPr>
+            </a:br>
+            <a:r>
+              <a:rPr lang="en-CA" sz="2000" dirty="0" smtClean="0">
+                <a:latin typeface="Century Gothic" pitchFamily="34" charset="0"/>
+              </a:rPr>
+              <a:t>Note: The program must have an xml file loaded in order to function correctly</a:t>
+            </a:r>
+          </a:p>
+          <a:p>
+            <a:pPr>
+              <a:buFontTx/>
+              <a:buChar char="-"/>
+            </a:pPr>
+            <a:endParaRPr lang="en-CA" sz="2000" dirty="0" smtClean="0">
+              <a:latin typeface="Century Gothic" pitchFamily="34" charset="0"/>
+            </a:endParaRPr>
           </a:p>
         </p:txBody>
       </p:sp>
       <p:sp>
         <p:nvSpPr>
-          <p:cNvPr id="6" name="TextBox 5"/>
-          <p:cNvSpPr txBox="1"/>
-          <p:nvPr/>
+          <p:cNvPr id="8" name="Slide Number Placeholder 7"/>
+          <p:cNvSpPr>
+            <a:spLocks noGrp="1"/>
+          </p:cNvSpPr>
+          <p:nvPr>
+            <p:ph type="sldNum" sz="quarter" idx="12"/>
+          </p:nvPr>
         </p:nvSpPr>
-        <p:spPr>
-          <a:xfrm>
-            <a:off x="1119116" y="3664003"/>
-            <a:ext cx="7301553" cy="400110"/>
-          </a:xfrm>
-          <a:prstGeom prst="rect">
-            <a:avLst/>
-          </a:prstGeom>
-          <a:noFill/>
-        </p:spPr>
+        <p:spPr/>
         <p:txBody>
-          <a:bodyPr wrap="square" rtlCol="0">
-            <a:spAutoFit/>
-          </a:bodyPr>
+          <a:bodyPr/>
           <a:lstStyle/>
           <a:p>
-            <a:r>
-              <a:rPr lang="en-CA" sz="2000" dirty="0" smtClean="0">
-                <a:latin typeface="Century Gothic" pitchFamily="34" charset="0"/>
-              </a:rPr>
-              <a:t>   -many unit tests:</a:t>
-            </a:r>
-            <a:endParaRPr lang="en-CA" sz="2000" dirty="0">
-              <a:latin typeface="Century Gothic" pitchFamily="34" charset="0"/>
-            </a:endParaRPr>
-          </a:p>
-        </p:txBody>
-      </p:sp>
-      <p:sp>
-        <p:nvSpPr>
-          <p:cNvPr id="7" name="TextBox 6"/>
-          <p:cNvSpPr txBox="1"/>
-          <p:nvPr/>
-        </p:nvSpPr>
-        <p:spPr>
-          <a:xfrm>
-            <a:off x="1119116" y="4995081"/>
-            <a:ext cx="7301553" cy="369332"/>
-          </a:xfrm>
-          <a:prstGeom prst="rect">
-            <a:avLst/>
-          </a:prstGeom>
-          <a:noFill/>
-        </p:spPr>
-        <p:txBody>
-          <a:bodyPr wrap="square" rtlCol="0">
-            <a:spAutoFit/>
-          </a:bodyPr>
-          <a:lstStyle/>
-          <a:p>
-            <a:r>
-              <a:rPr lang="en-CA" dirty="0" smtClean="0">
-                <a:latin typeface="Century Gothic" pitchFamily="34" charset="0"/>
-              </a:rPr>
-              <a:t>   -integration test </a:t>
-            </a:r>
-            <a:endParaRPr lang="en-CA" dirty="0">
-              <a:latin typeface="Century Gothic" pitchFamily="34" charset="0"/>
-            </a:endParaRPr>
+            <a:fld id="{4A5A7388-53DE-DF4C-B882-890D8596A7FC}" type="slidenum">
+              <a:rPr lang="en-US" smtClean="0"/>
+              <a:pPr/>
+              <a:t>8</a:t>
+            </a:fld>
+            <a:endParaRPr lang="en-US"/>
           </a:p>
         </p:txBody>
       </p:sp>
@@ -11055,7 +12437,7 @@
                 <a:latin typeface="Arial" pitchFamily="34" charset="0"/>
                 <a:cs typeface="Arial" pitchFamily="34" charset="0"/>
               </a:rPr>
-              <a:t>Demonstration</a:t>
+              <a:t>Main Menu Screen</a:t>
             </a:r>
             <a:endParaRPr lang="en-US" dirty="0">
               <a:effectLst>
@@ -11095,6 +12477,30 @@
           </a:prstGeom>
         </p:spPr>
       </p:pic>
+      <p:sp>
+        <p:nvSpPr>
+          <p:cNvPr id="4" name="Slide Number Placeholder 3"/>
+          <p:cNvSpPr>
+            <a:spLocks noGrp="1"/>
+          </p:cNvSpPr>
+          <p:nvPr>
+            <p:ph type="sldNum" sz="quarter" idx="12"/>
+          </p:nvPr>
+        </p:nvSpPr>
+        <p:spPr/>
+        <p:txBody>
+          <a:bodyPr/>
+          <a:lstStyle/>
+          <a:p>
+            <a:fld id="{4A5A7388-53DE-DF4C-B882-890D8596A7FC}" type="slidenum">
+              <a:rPr lang="en-US" smtClean="0"/>
+              <a:pPr/>
+              <a:t>9</a:t>
+            </a:fld>
+            <a:endParaRPr lang="en-US"/>
+          </a:p>
+        </p:txBody>
+      </p:sp>
     </p:spTree>
   </p:cSld>
   <p:clrMapOvr>

</xml_diff>